<commit_message>
Updates to Lecture 3:
- fixed error in proof of "numbers ending in 5 have their squares ending in 5"
- removed proof of sqrt(3) being irrational
- added footer to most pages
- renamed titles of some slides
- probably some other changes too.
</commit_message>
<xml_diff>
--- a/University_of_Waterloo/Fall_2021/MATH135/UW_Fall2021_MATH135_Lecture3.pptx
+++ b/University_of_Waterloo/Fall_2021/MATH135/UW_Fall2021_MATH135_Lecture3.pptx
@@ -4,17 +4,18 @@
   <p:sldMasterIdLst>
     <p:sldMasterId id="2147483648" r:id="rId1"/>
   </p:sldMasterIdLst>
+  <p:notesMasterIdLst>
+    <p:notesMasterId r:id="rId10"/>
+  </p:notesMasterIdLst>
   <p:sldIdLst>
     <p:sldId id="269" r:id="rId2"/>
-    <p:sldId id="257" r:id="rId3"/>
-    <p:sldId id="265" r:id="rId4"/>
-    <p:sldId id="256" r:id="rId5"/>
+    <p:sldId id="256" r:id="rId3"/>
+    <p:sldId id="257" r:id="rId4"/>
+    <p:sldId id="265" r:id="rId5"/>
     <p:sldId id="263" r:id="rId6"/>
     <p:sldId id="262" r:id="rId7"/>
     <p:sldId id="270" r:id="rId8"/>
     <p:sldId id="266" r:id="rId9"/>
-    <p:sldId id="267" r:id="rId10"/>
-    <p:sldId id="268" r:id="rId11"/>
   </p:sldIdLst>
   <p:sldSz cx="12192000" cy="6858000"/>
   <p:notesSz cx="6858000" cy="9144000"/>
@@ -121,6 +122,355 @@
 </p:presentation>
 </file>
 
+<file path=ppt/notesMasters/notesMaster1.xml><?xml version="1.0" encoding="utf-8"?>
+<p:notesMaster xmlns:a="http://schemas.openxmlformats.org/drawingml/2006/main" xmlns:r="http://schemas.openxmlformats.org/officeDocument/2006/relationships" xmlns:p="http://schemas.openxmlformats.org/presentationml/2006/main">
+  <p:cSld>
+    <p:bg>
+      <p:bgRef idx="1001">
+        <a:schemeClr val="bg1"/>
+      </p:bgRef>
+    </p:bg>
+    <p:spTree>
+      <p:nvGrpSpPr>
+        <p:cNvPr id="1" name=""/>
+        <p:cNvGrpSpPr/>
+        <p:nvPr/>
+      </p:nvGrpSpPr>
+      <p:grpSpPr>
+        <a:xfrm>
+          <a:off x="0" y="0"/>
+          <a:ext cx="0" cy="0"/>
+          <a:chOff x="0" y="0"/>
+          <a:chExt cx="0" cy="0"/>
+        </a:xfrm>
+      </p:grpSpPr>
+      <p:sp>
+        <p:nvSpPr>
+          <p:cNvPr id="2" name="Header Placeholder 1"/>
+          <p:cNvSpPr>
+            <a:spLocks noGrp="1"/>
+          </p:cNvSpPr>
+          <p:nvPr>
+            <p:ph type="hdr" sz="quarter"/>
+          </p:nvPr>
+        </p:nvSpPr>
+        <p:spPr>
+          <a:xfrm>
+            <a:off x="0" y="0"/>
+            <a:ext cx="2971800" cy="458788"/>
+          </a:xfrm>
+          <a:prstGeom prst="rect">
+            <a:avLst/>
+          </a:prstGeom>
+        </p:spPr>
+        <p:txBody>
+          <a:bodyPr vert="horz" lIns="91440" tIns="45720" rIns="91440" bIns="45720" rtlCol="0"/>
+          <a:lstStyle>
+            <a:lvl1pPr algn="l">
+              <a:defRPr sz="1200"/>
+            </a:lvl1pPr>
+          </a:lstStyle>
+          <a:p>
+            <a:endParaRPr lang="en-US"/>
+          </a:p>
+        </p:txBody>
+      </p:sp>
+      <p:sp>
+        <p:nvSpPr>
+          <p:cNvPr id="3" name="Date Placeholder 2"/>
+          <p:cNvSpPr>
+            <a:spLocks noGrp="1"/>
+          </p:cNvSpPr>
+          <p:nvPr>
+            <p:ph type="dt" idx="1"/>
+          </p:nvPr>
+        </p:nvSpPr>
+        <p:spPr>
+          <a:xfrm>
+            <a:off x="3884613" y="0"/>
+            <a:ext cx="2971800" cy="458788"/>
+          </a:xfrm>
+          <a:prstGeom prst="rect">
+            <a:avLst/>
+          </a:prstGeom>
+        </p:spPr>
+        <p:txBody>
+          <a:bodyPr vert="horz" lIns="91440" tIns="45720" rIns="91440" bIns="45720" rtlCol="0"/>
+          <a:lstStyle>
+            <a:lvl1pPr algn="r">
+              <a:defRPr sz="1200"/>
+            </a:lvl1pPr>
+          </a:lstStyle>
+          <a:p>
+            <a:fld id="{D6C08F49-C374-42BF-9CCC-4986177E5AFB}" type="datetimeFigureOut">
+              <a:rPr lang="en-US" smtClean="0"/>
+              <a:t>9/15/2021</a:t>
+            </a:fld>
+            <a:endParaRPr lang="en-US"/>
+          </a:p>
+        </p:txBody>
+      </p:sp>
+      <p:sp>
+        <p:nvSpPr>
+          <p:cNvPr id="4" name="Slide Image Placeholder 3"/>
+          <p:cNvSpPr>
+            <a:spLocks noGrp="1" noRot="1" noChangeAspect="1"/>
+          </p:cNvSpPr>
+          <p:nvPr>
+            <p:ph type="sldImg" idx="2"/>
+          </p:nvPr>
+        </p:nvSpPr>
+        <p:spPr>
+          <a:xfrm>
+            <a:off x="685800" y="1143000"/>
+            <a:ext cx="5486400" cy="3086100"/>
+          </a:xfrm>
+          <a:prstGeom prst="rect">
+            <a:avLst/>
+          </a:prstGeom>
+          <a:noFill/>
+          <a:ln w="12700">
+            <a:solidFill>
+              <a:prstClr val="black"/>
+            </a:solidFill>
+          </a:ln>
+        </p:spPr>
+        <p:txBody>
+          <a:bodyPr vert="horz" lIns="91440" tIns="45720" rIns="91440" bIns="45720" rtlCol="0" anchor="ctr"/>
+          <a:lstStyle/>
+          <a:p>
+            <a:endParaRPr lang="en-US"/>
+          </a:p>
+        </p:txBody>
+      </p:sp>
+      <p:sp>
+        <p:nvSpPr>
+          <p:cNvPr id="5" name="Notes Placeholder 4"/>
+          <p:cNvSpPr>
+            <a:spLocks noGrp="1"/>
+          </p:cNvSpPr>
+          <p:nvPr>
+            <p:ph type="body" sz="quarter" idx="3"/>
+          </p:nvPr>
+        </p:nvSpPr>
+        <p:spPr>
+          <a:xfrm>
+            <a:off x="685800" y="4400550"/>
+            <a:ext cx="5486400" cy="3600450"/>
+          </a:xfrm>
+          <a:prstGeom prst="rect">
+            <a:avLst/>
+          </a:prstGeom>
+        </p:spPr>
+        <p:txBody>
+          <a:bodyPr vert="horz" lIns="91440" tIns="45720" rIns="91440" bIns="45720" rtlCol="0"/>
+          <a:lstStyle/>
+          <a:p>
+            <a:pPr lvl="0"/>
+            <a:r>
+              <a:rPr lang="en-US"/>
+              <a:t>Edit Master text styles</a:t>
+            </a:r>
+          </a:p>
+          <a:p>
+            <a:pPr lvl="1"/>
+            <a:r>
+              <a:rPr lang="en-US"/>
+              <a:t>Second level</a:t>
+            </a:r>
+          </a:p>
+          <a:p>
+            <a:pPr lvl="2"/>
+            <a:r>
+              <a:rPr lang="en-US"/>
+              <a:t>Third level</a:t>
+            </a:r>
+          </a:p>
+          <a:p>
+            <a:pPr lvl="3"/>
+            <a:r>
+              <a:rPr lang="en-US"/>
+              <a:t>Fourth level</a:t>
+            </a:r>
+          </a:p>
+          <a:p>
+            <a:pPr lvl="4"/>
+            <a:r>
+              <a:rPr lang="en-US"/>
+              <a:t>Fifth level</a:t>
+            </a:r>
+          </a:p>
+        </p:txBody>
+      </p:sp>
+      <p:sp>
+        <p:nvSpPr>
+          <p:cNvPr id="6" name="Footer Placeholder 5"/>
+          <p:cNvSpPr>
+            <a:spLocks noGrp="1"/>
+          </p:cNvSpPr>
+          <p:nvPr>
+            <p:ph type="ftr" sz="quarter" idx="4"/>
+          </p:nvPr>
+        </p:nvSpPr>
+        <p:spPr>
+          <a:xfrm>
+            <a:off x="0" y="8685213"/>
+            <a:ext cx="2971800" cy="458787"/>
+          </a:xfrm>
+          <a:prstGeom prst="rect">
+            <a:avLst/>
+          </a:prstGeom>
+        </p:spPr>
+        <p:txBody>
+          <a:bodyPr vert="horz" lIns="91440" tIns="45720" rIns="91440" bIns="45720" rtlCol="0" anchor="b"/>
+          <a:lstStyle>
+            <a:lvl1pPr algn="l">
+              <a:defRPr sz="1200"/>
+            </a:lvl1pPr>
+          </a:lstStyle>
+          <a:p>
+            <a:endParaRPr lang="en-US"/>
+          </a:p>
+        </p:txBody>
+      </p:sp>
+      <p:sp>
+        <p:nvSpPr>
+          <p:cNvPr id="7" name="Slide Number Placeholder 6"/>
+          <p:cNvSpPr>
+            <a:spLocks noGrp="1"/>
+          </p:cNvSpPr>
+          <p:nvPr>
+            <p:ph type="sldNum" sz="quarter" idx="5"/>
+          </p:nvPr>
+        </p:nvSpPr>
+        <p:spPr>
+          <a:xfrm>
+            <a:off x="3884613" y="8685213"/>
+            <a:ext cx="2971800" cy="458787"/>
+          </a:xfrm>
+          <a:prstGeom prst="rect">
+            <a:avLst/>
+          </a:prstGeom>
+        </p:spPr>
+        <p:txBody>
+          <a:bodyPr vert="horz" lIns="91440" tIns="45720" rIns="91440" bIns="45720" rtlCol="0" anchor="b"/>
+          <a:lstStyle>
+            <a:lvl1pPr algn="r">
+              <a:defRPr sz="1200"/>
+            </a:lvl1pPr>
+          </a:lstStyle>
+          <a:p>
+            <a:fld id="{86A5E78E-6B62-4162-B66A-03A100682ABD}" type="slidenum">
+              <a:rPr lang="en-US" smtClean="0"/>
+              <a:t>‹#›</a:t>
+            </a:fld>
+            <a:endParaRPr lang="en-US"/>
+          </a:p>
+        </p:txBody>
+      </p:sp>
+    </p:spTree>
+    <p:extLst>
+      <p:ext uri="{BB962C8B-B14F-4D97-AF65-F5344CB8AC3E}">
+        <p14:creationId xmlns:p14="http://schemas.microsoft.com/office/powerpoint/2010/main" val="165226971"/>
+      </p:ext>
+    </p:extLst>
+  </p:cSld>
+  <p:clrMap bg1="lt1" tx1="dk1" bg2="lt2" tx2="dk2" accent1="accent1" accent2="accent2" accent3="accent3" accent4="accent4" accent5="accent5" accent6="accent6" hlink="hlink" folHlink="folHlink"/>
+  <p:notesStyle>
+    <a:lvl1pPr marL="0" algn="l" defTabSz="914400" rtl="0" eaLnBrk="1" latinLnBrk="0" hangingPunct="1">
+      <a:defRPr sz="1200" kern="1200">
+        <a:solidFill>
+          <a:schemeClr val="tx1"/>
+        </a:solidFill>
+        <a:latin typeface="+mn-lt"/>
+        <a:ea typeface="+mn-ea"/>
+        <a:cs typeface="+mn-cs"/>
+      </a:defRPr>
+    </a:lvl1pPr>
+    <a:lvl2pPr marL="457200" algn="l" defTabSz="914400" rtl="0" eaLnBrk="1" latinLnBrk="0" hangingPunct="1">
+      <a:defRPr sz="1200" kern="1200">
+        <a:solidFill>
+          <a:schemeClr val="tx1"/>
+        </a:solidFill>
+        <a:latin typeface="+mn-lt"/>
+        <a:ea typeface="+mn-ea"/>
+        <a:cs typeface="+mn-cs"/>
+      </a:defRPr>
+    </a:lvl2pPr>
+    <a:lvl3pPr marL="914400" algn="l" defTabSz="914400" rtl="0" eaLnBrk="1" latinLnBrk="0" hangingPunct="1">
+      <a:defRPr sz="1200" kern="1200">
+        <a:solidFill>
+          <a:schemeClr val="tx1"/>
+        </a:solidFill>
+        <a:latin typeface="+mn-lt"/>
+        <a:ea typeface="+mn-ea"/>
+        <a:cs typeface="+mn-cs"/>
+      </a:defRPr>
+    </a:lvl3pPr>
+    <a:lvl4pPr marL="1371600" algn="l" defTabSz="914400" rtl="0" eaLnBrk="1" latinLnBrk="0" hangingPunct="1">
+      <a:defRPr sz="1200" kern="1200">
+        <a:solidFill>
+          <a:schemeClr val="tx1"/>
+        </a:solidFill>
+        <a:latin typeface="+mn-lt"/>
+        <a:ea typeface="+mn-ea"/>
+        <a:cs typeface="+mn-cs"/>
+      </a:defRPr>
+    </a:lvl4pPr>
+    <a:lvl5pPr marL="1828800" algn="l" defTabSz="914400" rtl="0" eaLnBrk="1" latinLnBrk="0" hangingPunct="1">
+      <a:defRPr sz="1200" kern="1200">
+        <a:solidFill>
+          <a:schemeClr val="tx1"/>
+        </a:solidFill>
+        <a:latin typeface="+mn-lt"/>
+        <a:ea typeface="+mn-ea"/>
+        <a:cs typeface="+mn-cs"/>
+      </a:defRPr>
+    </a:lvl5pPr>
+    <a:lvl6pPr marL="2286000" algn="l" defTabSz="914400" rtl="0" eaLnBrk="1" latinLnBrk="0" hangingPunct="1">
+      <a:defRPr sz="1200" kern="1200">
+        <a:solidFill>
+          <a:schemeClr val="tx1"/>
+        </a:solidFill>
+        <a:latin typeface="+mn-lt"/>
+        <a:ea typeface="+mn-ea"/>
+        <a:cs typeface="+mn-cs"/>
+      </a:defRPr>
+    </a:lvl6pPr>
+    <a:lvl7pPr marL="2743200" algn="l" defTabSz="914400" rtl="0" eaLnBrk="1" latinLnBrk="0" hangingPunct="1">
+      <a:defRPr sz="1200" kern="1200">
+        <a:solidFill>
+          <a:schemeClr val="tx1"/>
+        </a:solidFill>
+        <a:latin typeface="+mn-lt"/>
+        <a:ea typeface="+mn-ea"/>
+        <a:cs typeface="+mn-cs"/>
+      </a:defRPr>
+    </a:lvl7pPr>
+    <a:lvl8pPr marL="3200400" algn="l" defTabSz="914400" rtl="0" eaLnBrk="1" latinLnBrk="0" hangingPunct="1">
+      <a:defRPr sz="1200" kern="1200">
+        <a:solidFill>
+          <a:schemeClr val="tx1"/>
+        </a:solidFill>
+        <a:latin typeface="+mn-lt"/>
+        <a:ea typeface="+mn-ea"/>
+        <a:cs typeface="+mn-cs"/>
+      </a:defRPr>
+    </a:lvl8pPr>
+    <a:lvl9pPr marL="3657600" algn="l" defTabSz="914400" rtl="0" eaLnBrk="1" latinLnBrk="0" hangingPunct="1">
+      <a:defRPr sz="1200" kern="1200">
+        <a:solidFill>
+          <a:schemeClr val="tx1"/>
+        </a:solidFill>
+        <a:latin typeface="+mn-lt"/>
+        <a:ea typeface="+mn-ea"/>
+        <a:cs typeface="+mn-cs"/>
+      </a:defRPr>
+    </a:lvl9pPr>
+  </p:notesStyle>
+</p:notesMaster>
+</file>
+
 <file path=ppt/slideLayouts/slideLayout1.xml><?xml version="1.0" encoding="utf-8"?>
 <p:sldLayout xmlns:a="http://schemas.openxmlformats.org/drawingml/2006/main" xmlns:r="http://schemas.openxmlformats.org/officeDocument/2006/relationships" xmlns:p="http://schemas.openxmlformats.org/presentationml/2006/main" type="title" preserve="1">
   <p:cSld name="Title Slide">
@@ -266,9 +616,9 @@
           <a:bodyPr/>
           <a:lstStyle/>
           <a:p>
-            <a:fld id="{6290209C-503C-4F42-9D62-38FCC3384F43}" type="datetimeFigureOut">
+            <a:fld id="{04CDA92F-1197-408B-9BB5-48AC78BC0AE3}" type="datetime1">
               <a:rPr lang="en-US" smtClean="0"/>
-              <a:t>9/13/2021</a:t>
+              <a:t>9/15/2021</a:t>
             </a:fld>
             <a:endParaRPr lang="en-US"/>
           </a:p>
@@ -295,6 +645,10 @@
           <a:bodyPr/>
           <a:lstStyle/>
           <a:p>
+            <a:r>
+              <a:rPr lang="sv-SE"/>
+              <a:t>Dr. Nike Dattani, MATH 135, Fall 2021</a:t>
+            </a:r>
             <a:endParaRPr lang="en-US"/>
           </a:p>
         </p:txBody>
@@ -315,7 +669,15 @@
             <p:ph type="sldNum" sz="quarter" idx="12"/>
           </p:nvPr>
         </p:nvSpPr>
-        <p:spPr/>
+        <p:spPr>
+          <a:xfrm>
+            <a:off x="9448800" y="6540182"/>
+            <a:ext cx="2743200" cy="365125"/>
+          </a:xfrm>
+          <a:prstGeom prst="rect">
+            <a:avLst/>
+          </a:prstGeom>
+        </p:spPr>
         <p:txBody>
           <a:bodyPr/>
           <a:lstStyle/>
@@ -464,9 +826,9 @@
           <a:bodyPr/>
           <a:lstStyle/>
           <a:p>
-            <a:fld id="{6290209C-503C-4F42-9D62-38FCC3384F43}" type="datetimeFigureOut">
+            <a:fld id="{2605256C-1C67-45D5-AA87-856D19AFBB2E}" type="datetime1">
               <a:rPr lang="en-US" smtClean="0"/>
-              <a:t>9/13/2021</a:t>
+              <a:t>9/15/2021</a:t>
             </a:fld>
             <a:endParaRPr lang="en-US"/>
           </a:p>
@@ -493,6 +855,10 @@
           <a:bodyPr/>
           <a:lstStyle/>
           <a:p>
+            <a:r>
+              <a:rPr lang="sv-SE"/>
+              <a:t>Dr. Nike Dattani, MATH 135, Fall 2021</a:t>
+            </a:r>
             <a:endParaRPr lang="en-US"/>
           </a:p>
         </p:txBody>
@@ -513,7 +879,15 @@
             <p:ph type="sldNum" sz="quarter" idx="12"/>
           </p:nvPr>
         </p:nvSpPr>
-        <p:spPr/>
+        <p:spPr>
+          <a:xfrm>
+            <a:off x="9448800" y="6540182"/>
+            <a:ext cx="2743200" cy="365125"/>
+          </a:xfrm>
+          <a:prstGeom prst="rect">
+            <a:avLst/>
+          </a:prstGeom>
+        </p:spPr>
         <p:txBody>
           <a:bodyPr/>
           <a:lstStyle/>
@@ -672,9 +1046,9 @@
           <a:bodyPr/>
           <a:lstStyle/>
           <a:p>
-            <a:fld id="{6290209C-503C-4F42-9D62-38FCC3384F43}" type="datetimeFigureOut">
+            <a:fld id="{A5532C66-191F-43A6-817D-9E010B360623}" type="datetime1">
               <a:rPr lang="en-US" smtClean="0"/>
-              <a:t>9/13/2021</a:t>
+              <a:t>9/15/2021</a:t>
             </a:fld>
             <a:endParaRPr lang="en-US"/>
           </a:p>
@@ -701,6 +1075,10 @@
           <a:bodyPr/>
           <a:lstStyle/>
           <a:p>
+            <a:r>
+              <a:rPr lang="sv-SE"/>
+              <a:t>Dr. Nike Dattani, MATH 135, Fall 2021</a:t>
+            </a:r>
             <a:endParaRPr lang="en-US"/>
           </a:p>
         </p:txBody>
@@ -721,7 +1099,15 @@
             <p:ph type="sldNum" sz="quarter" idx="12"/>
           </p:nvPr>
         </p:nvSpPr>
-        <p:spPr/>
+        <p:spPr>
+          <a:xfrm>
+            <a:off x="9448800" y="6540182"/>
+            <a:ext cx="2743200" cy="365125"/>
+          </a:xfrm>
+          <a:prstGeom prst="rect">
+            <a:avLst/>
+          </a:prstGeom>
+        </p:spPr>
         <p:txBody>
           <a:bodyPr/>
           <a:lstStyle/>
@@ -870,9 +1256,9 @@
           <a:bodyPr/>
           <a:lstStyle/>
           <a:p>
-            <a:fld id="{6290209C-503C-4F42-9D62-38FCC3384F43}" type="datetimeFigureOut">
+            <a:fld id="{CF5014D6-DED8-464A-900A-7A38F3FDC2F2}" type="datetime1">
               <a:rPr lang="en-US" smtClean="0"/>
-              <a:t>9/13/2021</a:t>
+              <a:t>9/15/2021</a:t>
             </a:fld>
             <a:endParaRPr lang="en-US"/>
           </a:p>
@@ -899,6 +1285,10 @@
           <a:bodyPr/>
           <a:lstStyle/>
           <a:p>
+            <a:r>
+              <a:rPr lang="sv-SE"/>
+              <a:t>Dr. Nike Dattani, MATH 135, Fall 2021</a:t>
+            </a:r>
             <a:endParaRPr lang="en-US"/>
           </a:p>
         </p:txBody>
@@ -919,7 +1309,15 @@
             <p:ph type="sldNum" sz="quarter" idx="12"/>
           </p:nvPr>
         </p:nvSpPr>
-        <p:spPr/>
+        <p:spPr>
+          <a:xfrm>
+            <a:off x="9448800" y="6540182"/>
+            <a:ext cx="2743200" cy="365125"/>
+          </a:xfrm>
+          <a:prstGeom prst="rect">
+            <a:avLst/>
+          </a:prstGeom>
+        </p:spPr>
         <p:txBody>
           <a:bodyPr/>
           <a:lstStyle/>
@@ -1145,9 +1543,9 @@
           <a:bodyPr/>
           <a:lstStyle/>
           <a:p>
-            <a:fld id="{6290209C-503C-4F42-9D62-38FCC3384F43}" type="datetimeFigureOut">
+            <a:fld id="{59256E22-65B4-4A7F-9664-39A22F852D5B}" type="datetime1">
               <a:rPr lang="en-US" smtClean="0"/>
-              <a:t>9/13/2021</a:t>
+              <a:t>9/15/2021</a:t>
             </a:fld>
             <a:endParaRPr lang="en-US"/>
           </a:p>
@@ -1174,6 +1572,10 @@
           <a:bodyPr/>
           <a:lstStyle/>
           <a:p>
+            <a:r>
+              <a:rPr lang="sv-SE"/>
+              <a:t>Dr. Nike Dattani, MATH 135, Fall 2021</a:t>
+            </a:r>
             <a:endParaRPr lang="en-US"/>
           </a:p>
         </p:txBody>
@@ -1194,7 +1596,15 @@
             <p:ph type="sldNum" sz="quarter" idx="12"/>
           </p:nvPr>
         </p:nvSpPr>
-        <p:spPr/>
+        <p:spPr>
+          <a:xfrm>
+            <a:off x="9448800" y="6540182"/>
+            <a:ext cx="2743200" cy="365125"/>
+          </a:xfrm>
+          <a:prstGeom prst="rect">
+            <a:avLst/>
+          </a:prstGeom>
+        </p:spPr>
         <p:txBody>
           <a:bodyPr/>
           <a:lstStyle/>
@@ -1410,9 +1820,9 @@
           <a:bodyPr/>
           <a:lstStyle/>
           <a:p>
-            <a:fld id="{6290209C-503C-4F42-9D62-38FCC3384F43}" type="datetimeFigureOut">
+            <a:fld id="{8CF7EC1B-A723-449D-9768-BED6C4BC67C3}" type="datetime1">
               <a:rPr lang="en-US" smtClean="0"/>
-              <a:t>9/13/2021</a:t>
+              <a:t>9/15/2021</a:t>
             </a:fld>
             <a:endParaRPr lang="en-US"/>
           </a:p>
@@ -1439,6 +1849,10 @@
           <a:bodyPr/>
           <a:lstStyle/>
           <a:p>
+            <a:r>
+              <a:rPr lang="sv-SE"/>
+              <a:t>Dr. Nike Dattani, MATH 135, Fall 2021</a:t>
+            </a:r>
             <a:endParaRPr lang="en-US"/>
           </a:p>
         </p:txBody>
@@ -1459,7 +1873,15 @@
             <p:ph type="sldNum" sz="quarter" idx="12"/>
           </p:nvPr>
         </p:nvSpPr>
-        <p:spPr/>
+        <p:spPr>
+          <a:xfrm>
+            <a:off x="9448800" y="6540182"/>
+            <a:ext cx="2743200" cy="365125"/>
+          </a:xfrm>
+          <a:prstGeom prst="rect">
+            <a:avLst/>
+          </a:prstGeom>
+        </p:spPr>
         <p:txBody>
           <a:bodyPr/>
           <a:lstStyle/>
@@ -1822,9 +2244,9 @@
           <a:bodyPr/>
           <a:lstStyle/>
           <a:p>
-            <a:fld id="{6290209C-503C-4F42-9D62-38FCC3384F43}" type="datetimeFigureOut">
+            <a:fld id="{CFD78E65-D20C-4576-B96E-9DED054E8C8C}" type="datetime1">
               <a:rPr lang="en-US" smtClean="0"/>
-              <a:t>9/13/2021</a:t>
+              <a:t>9/15/2021</a:t>
             </a:fld>
             <a:endParaRPr lang="en-US"/>
           </a:p>
@@ -1851,6 +2273,10 @@
           <a:bodyPr/>
           <a:lstStyle/>
           <a:p>
+            <a:r>
+              <a:rPr lang="sv-SE"/>
+              <a:t>Dr. Nike Dattani, MATH 135, Fall 2021</a:t>
+            </a:r>
             <a:endParaRPr lang="en-US"/>
           </a:p>
         </p:txBody>
@@ -1871,7 +2297,15 @@
             <p:ph type="sldNum" sz="quarter" idx="12"/>
           </p:nvPr>
         </p:nvSpPr>
-        <p:spPr/>
+        <p:spPr>
+          <a:xfrm>
+            <a:off x="9448800" y="6540182"/>
+            <a:ext cx="2743200" cy="365125"/>
+          </a:xfrm>
+          <a:prstGeom prst="rect">
+            <a:avLst/>
+          </a:prstGeom>
+        </p:spPr>
         <p:txBody>
           <a:bodyPr/>
           <a:lstStyle/>
@@ -1963,9 +2397,9 @@
           <a:bodyPr/>
           <a:lstStyle/>
           <a:p>
-            <a:fld id="{6290209C-503C-4F42-9D62-38FCC3384F43}" type="datetimeFigureOut">
+            <a:fld id="{F9A3A712-ECBB-42DF-98C9-0A1B260B4DBA}" type="datetime1">
               <a:rPr lang="en-US" smtClean="0"/>
-              <a:t>9/13/2021</a:t>
+              <a:t>9/15/2021</a:t>
             </a:fld>
             <a:endParaRPr lang="en-US"/>
           </a:p>
@@ -1992,6 +2426,10 @@
           <a:bodyPr/>
           <a:lstStyle/>
           <a:p>
+            <a:r>
+              <a:rPr lang="sv-SE"/>
+              <a:t>Dr. Nike Dattani, MATH 135, Fall 2021</a:t>
+            </a:r>
             <a:endParaRPr lang="en-US"/>
           </a:p>
         </p:txBody>
@@ -2012,7 +2450,15 @@
             <p:ph type="sldNum" sz="quarter" idx="12"/>
           </p:nvPr>
         </p:nvSpPr>
-        <p:spPr/>
+        <p:spPr>
+          <a:xfrm>
+            <a:off x="9448800" y="6540182"/>
+            <a:ext cx="2743200" cy="365125"/>
+          </a:xfrm>
+          <a:prstGeom prst="rect">
+            <a:avLst/>
+          </a:prstGeom>
+        </p:spPr>
         <p:txBody>
           <a:bodyPr/>
           <a:lstStyle/>
@@ -2076,9 +2522,9 @@
           <a:bodyPr/>
           <a:lstStyle/>
           <a:p>
-            <a:fld id="{6290209C-503C-4F42-9D62-38FCC3384F43}" type="datetimeFigureOut">
+            <a:fld id="{65D6F95D-17A9-40E9-A32D-70E8E0287FDF}" type="datetime1">
               <a:rPr lang="en-US" smtClean="0"/>
-              <a:t>9/13/2021</a:t>
+              <a:t>9/15/2021</a:t>
             </a:fld>
             <a:endParaRPr lang="en-US"/>
           </a:p>
@@ -2105,6 +2551,10 @@
           <a:bodyPr/>
           <a:lstStyle/>
           <a:p>
+            <a:r>
+              <a:rPr lang="sv-SE"/>
+              <a:t>Dr. Nike Dattani, MATH 135, Fall 2021</a:t>
+            </a:r>
             <a:endParaRPr lang="en-US"/>
           </a:p>
         </p:txBody>
@@ -2125,7 +2575,15 @@
             <p:ph type="sldNum" sz="quarter" idx="12"/>
           </p:nvPr>
         </p:nvSpPr>
-        <p:spPr/>
+        <p:spPr>
+          <a:xfrm>
+            <a:off x="9448800" y="6540182"/>
+            <a:ext cx="2743200" cy="365125"/>
+          </a:xfrm>
+          <a:prstGeom prst="rect">
+            <a:avLst/>
+          </a:prstGeom>
+        </p:spPr>
         <p:txBody>
           <a:bodyPr/>
           <a:lstStyle/>
@@ -2387,9 +2845,9 @@
           <a:bodyPr/>
           <a:lstStyle/>
           <a:p>
-            <a:fld id="{6290209C-503C-4F42-9D62-38FCC3384F43}" type="datetimeFigureOut">
+            <a:fld id="{B1C69CBB-BC78-4AE4-BACB-E4DA3CFB1E69}" type="datetime1">
               <a:rPr lang="en-US" smtClean="0"/>
-              <a:t>9/13/2021</a:t>
+              <a:t>9/15/2021</a:t>
             </a:fld>
             <a:endParaRPr lang="en-US"/>
           </a:p>
@@ -2416,6 +2874,10 @@
           <a:bodyPr/>
           <a:lstStyle/>
           <a:p>
+            <a:r>
+              <a:rPr lang="sv-SE"/>
+              <a:t>Dr. Nike Dattani, MATH 135, Fall 2021</a:t>
+            </a:r>
             <a:endParaRPr lang="en-US"/>
           </a:p>
         </p:txBody>
@@ -2436,7 +2898,15 @@
             <p:ph type="sldNum" sz="quarter" idx="12"/>
           </p:nvPr>
         </p:nvSpPr>
-        <p:spPr/>
+        <p:spPr>
+          <a:xfrm>
+            <a:off x="9448800" y="6540182"/>
+            <a:ext cx="2743200" cy="365125"/>
+          </a:xfrm>
+          <a:prstGeom prst="rect">
+            <a:avLst/>
+          </a:prstGeom>
+        </p:spPr>
         <p:txBody>
           <a:bodyPr/>
           <a:lstStyle/>
@@ -2675,9 +3145,9 @@
           <a:bodyPr/>
           <a:lstStyle/>
           <a:p>
-            <a:fld id="{6290209C-503C-4F42-9D62-38FCC3384F43}" type="datetimeFigureOut">
+            <a:fld id="{0C00C484-FA3F-4723-8A77-A35ACA06B41D}" type="datetime1">
               <a:rPr lang="en-US" smtClean="0"/>
-              <a:t>9/13/2021</a:t>
+              <a:t>9/15/2021</a:t>
             </a:fld>
             <a:endParaRPr lang="en-US"/>
           </a:p>
@@ -2704,6 +3174,10 @@
           <a:bodyPr/>
           <a:lstStyle/>
           <a:p>
+            <a:r>
+              <a:rPr lang="sv-SE"/>
+              <a:t>Dr. Nike Dattani, MATH 135, Fall 2021</a:t>
+            </a:r>
             <a:endParaRPr lang="en-US"/>
           </a:p>
         </p:txBody>
@@ -2724,7 +3198,15 @@
             <p:ph type="sldNum" sz="quarter" idx="12"/>
           </p:nvPr>
         </p:nvSpPr>
-        <p:spPr/>
+        <p:spPr>
+          <a:xfrm>
+            <a:off x="9448800" y="6540182"/>
+            <a:ext cx="2743200" cy="365125"/>
+          </a:xfrm>
+          <a:prstGeom prst="rect">
+            <a:avLst/>
+          </a:prstGeom>
+        </p:spPr>
         <p:txBody>
           <a:bodyPr/>
           <a:lstStyle/>
@@ -2916,9 +3398,9 @@
             </a:lvl1pPr>
           </a:lstStyle>
           <a:p>
-            <a:fld id="{6290209C-503C-4F42-9D62-38FCC3384F43}" type="datetimeFigureOut">
+            <a:fld id="{E35672E0-2D02-4FD2-AC38-F3C1A076DDB0}" type="datetime1">
               <a:rPr lang="en-US" smtClean="0"/>
-              <a:t>9/13/2021</a:t>
+              <a:t>9/15/2021</a:t>
             </a:fld>
             <a:endParaRPr lang="en-US"/>
           </a:p>
@@ -2942,7 +3424,7 @@
         </p:nvSpPr>
         <p:spPr>
           <a:xfrm>
-            <a:off x="4038600" y="6356350"/>
+            <a:off x="8919210" y="6538912"/>
             <a:ext cx="4114800" cy="365125"/>
           </a:xfrm>
           <a:prstGeom prst="rect">
@@ -2963,54 +3445,11 @@
             </a:lvl1pPr>
           </a:lstStyle>
           <a:p>
-            <a:endParaRPr lang="en-US"/>
-          </a:p>
-        </p:txBody>
-      </p:sp>
-      <p:sp>
-        <p:nvSpPr>
-          <p:cNvPr id="6" name="Slide Number Placeholder 5">
-            <a:extLst>
-              <a:ext uri="{FF2B5EF4-FFF2-40B4-BE49-F238E27FC236}">
-                <a16:creationId xmlns:a16="http://schemas.microsoft.com/office/drawing/2014/main" id="{6F0ACC64-5367-46C2-8738-8CCF3FC89130}"/>
-              </a:ext>
-            </a:extLst>
-          </p:cNvPr>
-          <p:cNvSpPr>
-            <a:spLocks noGrp="1"/>
-          </p:cNvSpPr>
-          <p:nvPr>
-            <p:ph type="sldNum" sz="quarter" idx="4"/>
-          </p:nvPr>
-        </p:nvSpPr>
-        <p:spPr>
-          <a:xfrm>
-            <a:off x="8610600" y="6356350"/>
-            <a:ext cx="2743200" cy="365125"/>
-          </a:xfrm>
-          <a:prstGeom prst="rect">
-            <a:avLst/>
-          </a:prstGeom>
-        </p:spPr>
-        <p:txBody>
-          <a:bodyPr vert="horz" lIns="91440" tIns="45720" rIns="91440" bIns="45720" rtlCol="0" anchor="ctr"/>
-          <a:lstStyle>
-            <a:lvl1pPr algn="r">
-              <a:defRPr sz="1200">
-                <a:solidFill>
-                  <a:schemeClr val="tx1">
-                    <a:tint val="75000"/>
-                  </a:schemeClr>
-                </a:solidFill>
-              </a:defRPr>
-            </a:lvl1pPr>
-          </a:lstStyle>
-          <a:p>
-            <a:fld id="{F76B1B54-9536-4654-B658-6C9F83E3D8D2}" type="slidenum">
-              <a:rPr lang="en-US" smtClean="0"/>
-              <a:t>‹#›</a:t>
-            </a:fld>
-            <a:endParaRPr lang="en-US"/>
+            <a:r>
+              <a:rPr lang="sv-SE"/>
+              <a:t>Dr. Nike Dattani, MATH 135, Fall 2021</a:t>
+            </a:r>
+            <a:endParaRPr lang="en-US" dirty="0"/>
           </a:p>
         </p:txBody>
       </p:sp>
@@ -3035,6 +3474,7 @@
     <p:sldLayoutId id="2147483658" r:id="rId10"/>
     <p:sldLayoutId id="2147483659" r:id="rId11"/>
   </p:sldLayoutIdLst>
+  <p:hf sldNum="0" hdr="0" dt="0"/>
   <p:txStyles>
     <p:titleStyle>
       <a:lvl1pPr algn="l" defTabSz="914400" rtl="0" eaLnBrk="1" latinLnBrk="0" hangingPunct="1">
@@ -3396,6 +3836,35 @@
           </a:p>
         </p:txBody>
       </p:sp>
+      <p:sp>
+        <p:nvSpPr>
+          <p:cNvPr id="2" name="Footer Placeholder 1">
+            <a:extLst>
+              <a:ext uri="{FF2B5EF4-FFF2-40B4-BE49-F238E27FC236}">
+                <a16:creationId xmlns:a16="http://schemas.microsoft.com/office/drawing/2014/main" id="{7A45F244-416F-4DCE-8C41-6B021BDCDDF5}"/>
+              </a:ext>
+            </a:extLst>
+          </p:cNvPr>
+          <p:cNvSpPr>
+            <a:spLocks noGrp="1"/>
+          </p:cNvSpPr>
+          <p:nvPr>
+            <p:ph type="ftr" sz="quarter" idx="11"/>
+          </p:nvPr>
+        </p:nvSpPr>
+        <p:spPr/>
+        <p:txBody>
+          <a:bodyPr/>
+          <a:lstStyle/>
+          <a:p>
+            <a:r>
+              <a:rPr lang="sv-SE"/>
+              <a:t>Dr. Nike Dattani, MATH 135, Fall 2021</a:t>
+            </a:r>
+            <a:endParaRPr lang="en-US"/>
+          </a:p>
+        </p:txBody>
+      </p:sp>
     </p:spTree>
     <p:extLst>
       <p:ext uri="{BB962C8B-B14F-4D97-AF65-F5344CB8AC3E}">
@@ -3406,1498 +3875,6 @@
   <p:clrMapOvr>
     <a:masterClrMapping/>
   </p:clrMapOvr>
-</p:sld>
-</file>
-
-<file path=ppt/slides/slide10.xml><?xml version="1.0" encoding="utf-8"?>
-<p:sld xmlns:a="http://schemas.openxmlformats.org/drawingml/2006/main" xmlns:r="http://schemas.openxmlformats.org/officeDocument/2006/relationships" xmlns:p="http://schemas.openxmlformats.org/presentationml/2006/main">
-  <p:cSld>
-    <p:spTree>
-      <p:nvGrpSpPr>
-        <p:cNvPr id="1" name=""/>
-        <p:cNvGrpSpPr/>
-        <p:nvPr/>
-      </p:nvGrpSpPr>
-      <p:grpSpPr>
-        <a:xfrm>
-          <a:off x="0" y="0"/>
-          <a:ext cx="0" cy="0"/>
-          <a:chOff x="0" y="0"/>
-          <a:chExt cx="0" cy="0"/>
-        </a:xfrm>
-      </p:grpSpPr>
-      <p:sp>
-        <p:nvSpPr>
-          <p:cNvPr id="2" name="Title 1">
-            <a:extLst>
-              <a:ext uri="{FF2B5EF4-FFF2-40B4-BE49-F238E27FC236}">
-                <a16:creationId xmlns:a16="http://schemas.microsoft.com/office/drawing/2014/main" id="{3DFDFE6E-0F70-4498-A727-114AF49CE2A5}"/>
-              </a:ext>
-            </a:extLst>
-          </p:cNvPr>
-          <p:cNvSpPr>
-            <a:spLocks noGrp="1"/>
-          </p:cNvSpPr>
-          <p:nvPr>
-            <p:ph type="ctrTitle"/>
-          </p:nvPr>
-        </p:nvSpPr>
-        <p:spPr>
-          <a:xfrm>
-            <a:off x="366318" y="427839"/>
-            <a:ext cx="10472257" cy="3236053"/>
-          </a:xfrm>
-        </p:spPr>
-        <p:txBody>
-          <a:bodyPr>
-            <a:normAutofit/>
-          </a:bodyPr>
-          <a:lstStyle/>
-          <a:p>
-            <a:br>
-              <a:rPr lang="en-US" dirty="0"/>
-            </a:br>
-            <a:br>
-              <a:rPr lang="en-US" dirty="0"/>
-            </a:br>
-            <a:endParaRPr lang="en-US" dirty="0"/>
-          </a:p>
-        </p:txBody>
-      </p:sp>
-      <p:sp>
-        <p:nvSpPr>
-          <p:cNvPr id="8" name="TextBox 7">
-            <a:extLst>
-              <a:ext uri="{FF2B5EF4-FFF2-40B4-BE49-F238E27FC236}">
-                <a16:creationId xmlns:a16="http://schemas.microsoft.com/office/drawing/2014/main" id="{53B09C95-0B4A-4BCD-88A9-77079655ADE2}"/>
-              </a:ext>
-            </a:extLst>
-          </p:cNvPr>
-          <p:cNvSpPr txBox="1"/>
-          <p:nvPr/>
-        </p:nvSpPr>
-        <p:spPr>
-          <a:xfrm>
-            <a:off x="0" y="114418"/>
-            <a:ext cx="11952303" cy="2462213"/>
-          </a:xfrm>
-          <a:prstGeom prst="rect">
-            <a:avLst/>
-          </a:prstGeom>
-          <a:noFill/>
-        </p:spPr>
-        <p:txBody>
-          <a:bodyPr wrap="square" rtlCol="0">
-            <a:spAutoFit/>
-          </a:bodyPr>
-          <a:lstStyle/>
-          <a:p>
-            <a:r>
-              <a:rPr lang="en-US" sz="2400" dirty="0"/>
-              <a:t>Assumption: ∃ </a:t>
-            </a:r>
-            <a:r>
-              <a:rPr lang="en-US" sz="2400" dirty="0" err="1"/>
-              <a:t>p,q</a:t>
-            </a:r>
-            <a:r>
-              <a:rPr lang="en-US" sz="2400" dirty="0"/>
-              <a:t> </a:t>
-            </a:r>
-            <a:r>
-              <a:rPr lang="el-GR" sz="2400" dirty="0"/>
-              <a:t>ϵ</a:t>
-            </a:r>
-            <a:r>
-              <a:rPr lang="en-US" sz="2400" dirty="0"/>
-              <a:t> ℤ   </a:t>
-            </a:r>
-            <a:r>
-              <a:rPr lang="en-US" sz="2400" dirty="0" err="1"/>
-              <a:t>s.t.</a:t>
-            </a:r>
-            <a:r>
-              <a:rPr lang="en-US" sz="2400" dirty="0"/>
-              <a:t>  sqrt(3) = p/q</a:t>
-            </a:r>
-          </a:p>
-          <a:p>
-            <a:endParaRPr lang="en-US" sz="1000" u="sng" dirty="0"/>
-          </a:p>
-          <a:p>
-            <a:r>
-              <a:rPr lang="en-US" sz="2400" dirty="0"/>
-              <a:t>	</a:t>
-            </a:r>
-          </a:p>
-          <a:p>
-            <a:endParaRPr lang="en-US" sz="2400" u="sng" dirty="0"/>
-          </a:p>
-          <a:p>
-            <a:endParaRPr lang="en-US" sz="2400" u="sng" dirty="0"/>
-          </a:p>
-          <a:p>
-            <a:endParaRPr lang="en-US" sz="2400" u="sng" dirty="0"/>
-          </a:p>
-          <a:p>
-            <a:r>
-              <a:rPr lang="en-US" sz="2400" dirty="0"/>
-              <a:t>		</a:t>
-            </a:r>
-            <a:endParaRPr lang="en-US" sz="2400" u="sng" dirty="0"/>
-          </a:p>
-        </p:txBody>
-      </p:sp>
-      <p:sp>
-        <p:nvSpPr>
-          <p:cNvPr id="4" name="TextBox 3">
-            <a:extLst>
-              <a:ext uri="{FF2B5EF4-FFF2-40B4-BE49-F238E27FC236}">
-                <a16:creationId xmlns:a16="http://schemas.microsoft.com/office/drawing/2014/main" id="{10617467-1835-4DF8-8633-386FB293A12D}"/>
-              </a:ext>
-            </a:extLst>
-          </p:cNvPr>
-          <p:cNvSpPr txBox="1"/>
-          <p:nvPr/>
-        </p:nvSpPr>
-        <p:spPr>
-          <a:xfrm>
-            <a:off x="26907" y="703357"/>
-            <a:ext cx="11952303" cy="10833735"/>
-          </a:xfrm>
-          <a:prstGeom prst="rect">
-            <a:avLst/>
-          </a:prstGeom>
-          <a:noFill/>
-        </p:spPr>
-        <p:txBody>
-          <a:bodyPr wrap="square" rtlCol="0">
-            <a:spAutoFit/>
-          </a:bodyPr>
-          <a:lstStyle/>
-          <a:p>
-            <a:r>
-              <a:rPr lang="en-US" u="sng" dirty="0"/>
-              <a:t>Case 2: is odd. </a:t>
-            </a:r>
-          </a:p>
-          <a:p>
-            <a:r>
-              <a:rPr lang="en-US" dirty="0"/>
-              <a:t>	      	=&gt; 3q</a:t>
-            </a:r>
-            <a:r>
-              <a:rPr lang="en-US" baseline="30000" dirty="0"/>
-              <a:t>2</a:t>
-            </a:r>
-            <a:r>
-              <a:rPr lang="en-US" dirty="0"/>
-              <a:t> is also odd (where else would 3q</a:t>
-            </a:r>
-            <a:r>
-              <a:rPr lang="en-US" baseline="30000" dirty="0"/>
-              <a:t>2 </a:t>
-            </a:r>
-            <a:r>
-              <a:rPr lang="en-US" dirty="0"/>
-              <a:t>get the factor of 2?).</a:t>
-            </a:r>
-          </a:p>
-          <a:p>
-            <a:r>
-              <a:rPr lang="en-US" dirty="0"/>
-              <a:t>		=&gt; p</a:t>
-            </a:r>
-            <a:r>
-              <a:rPr lang="en-US" baseline="30000" dirty="0"/>
-              <a:t>2</a:t>
-            </a:r>
-            <a:r>
-              <a:rPr lang="en-US" dirty="0"/>
-              <a:t> is also odd</a:t>
-            </a:r>
-          </a:p>
-          <a:p>
-            <a:endParaRPr lang="en-US" dirty="0"/>
-          </a:p>
-          <a:p>
-            <a:r>
-              <a:rPr lang="en-US" dirty="0"/>
-              <a:t>		∃ n </a:t>
-            </a:r>
-            <a:r>
-              <a:rPr lang="el-GR" dirty="0"/>
-              <a:t>ϵ</a:t>
-            </a:r>
-            <a:r>
-              <a:rPr lang="en-US" dirty="0"/>
-              <a:t> ℤ  </a:t>
-            </a:r>
-            <a:r>
-              <a:rPr lang="en-US" dirty="0" err="1"/>
-              <a:t>s.t.</a:t>
-            </a:r>
-            <a:r>
-              <a:rPr lang="en-US" dirty="0"/>
-              <a:t> p = 2n+1</a:t>
-            </a:r>
-          </a:p>
-          <a:p>
-            <a:r>
-              <a:rPr lang="en-US" dirty="0"/>
-              <a:t>		∃ m </a:t>
-            </a:r>
-            <a:r>
-              <a:rPr lang="el-GR" dirty="0"/>
-              <a:t>ϵ</a:t>
-            </a:r>
-            <a:r>
-              <a:rPr lang="en-US" dirty="0"/>
-              <a:t> ℤ </a:t>
-            </a:r>
-            <a:r>
-              <a:rPr lang="en-US" dirty="0" err="1"/>
-              <a:t>s.t.</a:t>
-            </a:r>
-            <a:r>
-              <a:rPr lang="en-US" dirty="0"/>
-              <a:t> q = 2m+1</a:t>
-            </a:r>
-          </a:p>
-          <a:p>
-            <a:r>
-              <a:rPr lang="en-US" dirty="0"/>
-              <a:t>		</a:t>
-            </a:r>
-          </a:p>
-          <a:p>
-            <a:r>
-              <a:rPr lang="en-US" dirty="0"/>
-              <a:t>		 sqrt(3) q                   =  p</a:t>
-            </a:r>
-          </a:p>
-          <a:p>
-            <a:r>
-              <a:rPr lang="en-US" dirty="0"/>
-              <a:t>		 sqrt(3) (2m + 1)       =  (2n + 1)</a:t>
-            </a:r>
-          </a:p>
-          <a:p>
-            <a:r>
-              <a:rPr lang="en-US" dirty="0"/>
-              <a:t>		 3(2m + 1)</a:t>
-            </a:r>
-            <a:r>
-              <a:rPr lang="en-US" baseline="30000" dirty="0"/>
-              <a:t>2</a:t>
-            </a:r>
-            <a:r>
-              <a:rPr lang="en-US" dirty="0"/>
-              <a:t>                =  (2n + 1)</a:t>
-            </a:r>
-            <a:r>
-              <a:rPr lang="en-US" baseline="30000" dirty="0"/>
-              <a:t>2</a:t>
-            </a:r>
-          </a:p>
-          <a:p>
-            <a:r>
-              <a:rPr lang="en-US" dirty="0"/>
-              <a:t>		 3(4m</a:t>
-            </a:r>
-            <a:r>
-              <a:rPr lang="en-US" baseline="30000" dirty="0"/>
-              <a:t>2</a:t>
-            </a:r>
-            <a:r>
-              <a:rPr lang="en-US" dirty="0"/>
-              <a:t> + 4m + 1)      = 4n</a:t>
-            </a:r>
-            <a:r>
-              <a:rPr lang="en-US" baseline="30000" dirty="0"/>
-              <a:t>2</a:t>
-            </a:r>
-            <a:r>
-              <a:rPr lang="en-US" dirty="0"/>
-              <a:t> + 4n + 1</a:t>
-            </a:r>
-          </a:p>
-          <a:p>
-            <a:r>
-              <a:rPr lang="en-US" dirty="0"/>
-              <a:t>		 12m</a:t>
-            </a:r>
-            <a:r>
-              <a:rPr lang="en-US" baseline="30000" dirty="0"/>
-              <a:t>2</a:t>
-            </a:r>
-            <a:r>
-              <a:rPr lang="en-US" dirty="0"/>
-              <a:t> + 12m + 3      = 4n</a:t>
-            </a:r>
-            <a:r>
-              <a:rPr lang="en-US" baseline="30000" dirty="0"/>
-              <a:t>2</a:t>
-            </a:r>
-            <a:r>
-              <a:rPr lang="en-US" dirty="0"/>
-              <a:t> + 4n + 1</a:t>
-            </a:r>
-          </a:p>
-          <a:p>
-            <a:r>
-              <a:rPr lang="en-US" dirty="0"/>
-              <a:t>		 12m</a:t>
-            </a:r>
-            <a:r>
-              <a:rPr lang="en-US" baseline="30000" dirty="0"/>
-              <a:t>2</a:t>
-            </a:r>
-            <a:r>
-              <a:rPr lang="en-US" dirty="0"/>
-              <a:t> + 12m + 2      = 2n</a:t>
-            </a:r>
-            <a:r>
-              <a:rPr lang="en-US" baseline="30000" dirty="0"/>
-              <a:t>2</a:t>
-            </a:r>
-            <a:r>
-              <a:rPr lang="en-US" dirty="0"/>
-              <a:t> + 2n </a:t>
-            </a:r>
-          </a:p>
-          <a:p>
-            <a:r>
-              <a:rPr lang="en-US" dirty="0"/>
-              <a:t>		 12(m</a:t>
-            </a:r>
-            <a:r>
-              <a:rPr lang="en-US" baseline="30000" dirty="0"/>
-              <a:t>2</a:t>
-            </a:r>
-            <a:r>
-              <a:rPr lang="en-US" dirty="0"/>
-              <a:t> + m) + 1        = 2n(n+1)</a:t>
-            </a:r>
-          </a:p>
-          <a:p>
-            <a:r>
-              <a:rPr lang="en-US" dirty="0"/>
-              <a:t> 	</a:t>
-            </a:r>
-          </a:p>
-          <a:p>
-            <a:r>
-              <a:rPr lang="en-US" dirty="0"/>
-              <a:t>		 Let n(n+1) = A,  m</a:t>
-            </a:r>
-            <a:r>
-              <a:rPr lang="en-US" baseline="30000" dirty="0"/>
-              <a:t>2</a:t>
-            </a:r>
-            <a:r>
-              <a:rPr lang="en-US" dirty="0"/>
-              <a:t> + m = B.</a:t>
-            </a:r>
-          </a:p>
-          <a:p>
-            <a:r>
-              <a:rPr lang="en-US" dirty="0"/>
-              <a:t>	   	 A </a:t>
-            </a:r>
-            <a:r>
-              <a:rPr lang="el-GR" dirty="0"/>
-              <a:t>ϵ</a:t>
-            </a:r>
-            <a:r>
-              <a:rPr lang="en-US" dirty="0"/>
-              <a:t> ℤ , B </a:t>
-            </a:r>
-            <a:r>
-              <a:rPr lang="el-GR" dirty="0"/>
-              <a:t>ϵ</a:t>
-            </a:r>
-            <a:r>
-              <a:rPr lang="en-US" dirty="0"/>
-              <a:t> ℤ 	</a:t>
-            </a:r>
-          </a:p>
-          <a:p>
-            <a:endParaRPr lang="en-US" dirty="0"/>
-          </a:p>
-          <a:p>
-            <a:r>
-              <a:rPr lang="en-US" dirty="0"/>
-              <a:t>		 12A + 1                        = 2B		</a:t>
-            </a:r>
-          </a:p>
-          <a:p>
-            <a:r>
-              <a:rPr lang="en-US" dirty="0"/>
-              <a:t>		 12A + 1 is odd.               2B is even.     </a:t>
-            </a:r>
-            <a:r>
-              <a:rPr lang="en-US" dirty="0">
-                <a:sym typeface="Wingdings" panose="05000000000000000000" pitchFamily="2" charset="2"/>
-              </a:rPr>
-              <a:t>   Contradiction! </a:t>
-            </a:r>
-          </a:p>
-          <a:p>
-            <a:r>
-              <a:rPr lang="en-US" dirty="0"/>
-              <a:t>∴</a:t>
-            </a:r>
-            <a:r>
-              <a:rPr lang="en-US" dirty="0">
-                <a:sym typeface="Wingdings" panose="05000000000000000000" pitchFamily="2" charset="2"/>
-              </a:rPr>
-              <a:t>  </a:t>
-            </a:r>
-            <a:r>
-              <a:rPr lang="en-US" dirty="0"/>
-              <a:t>¬(∃ </a:t>
-            </a:r>
-            <a:r>
-              <a:rPr lang="en-US" dirty="0" err="1"/>
-              <a:t>p,q</a:t>
-            </a:r>
-            <a:r>
-              <a:rPr lang="en-US" dirty="0"/>
-              <a:t> </a:t>
-            </a:r>
-            <a:r>
-              <a:rPr lang="el-GR" dirty="0"/>
-              <a:t>ϵ</a:t>
-            </a:r>
-            <a:r>
-              <a:rPr lang="en-US" dirty="0"/>
-              <a:t> ℤ   </a:t>
-            </a:r>
-            <a:r>
-              <a:rPr lang="en-US" dirty="0" err="1"/>
-              <a:t>s.t.</a:t>
-            </a:r>
-            <a:r>
-              <a:rPr lang="en-US" dirty="0"/>
-              <a:t>  sqrt(3) = p/q)</a:t>
-            </a:r>
-          </a:p>
-          <a:p>
-            <a:endParaRPr lang="en-US" sz="2400" u="sng" dirty="0"/>
-          </a:p>
-          <a:p>
-            <a:endParaRPr lang="en-US" sz="2400" u="sng" dirty="0"/>
-          </a:p>
-          <a:p>
-            <a:endParaRPr lang="en-US" sz="2400" u="sng" dirty="0"/>
-          </a:p>
-          <a:p>
-            <a:endParaRPr lang="en-US" sz="2400" u="sng" dirty="0"/>
-          </a:p>
-          <a:p>
-            <a:endParaRPr lang="en-US" sz="2400" u="sng" dirty="0"/>
-          </a:p>
-          <a:p>
-            <a:endParaRPr lang="en-US" sz="2400" u="sng" dirty="0"/>
-          </a:p>
-          <a:p>
-            <a:endParaRPr lang="en-US" sz="2400" u="sng" dirty="0"/>
-          </a:p>
-          <a:p>
-            <a:endParaRPr lang="en-US" sz="2400" u="sng" dirty="0"/>
-          </a:p>
-          <a:p>
-            <a:endParaRPr lang="en-US" sz="2400" u="sng" dirty="0"/>
-          </a:p>
-          <a:p>
-            <a:endParaRPr lang="en-US" sz="2400" u="sng" dirty="0"/>
-          </a:p>
-          <a:p>
-            <a:endParaRPr lang="en-US" sz="2400" u="sng" dirty="0"/>
-          </a:p>
-          <a:p>
-            <a:endParaRPr lang="en-US" sz="2400" dirty="0"/>
-          </a:p>
-          <a:p>
-            <a:endParaRPr lang="en-US" sz="800" dirty="0"/>
-          </a:p>
-          <a:p>
-            <a:endParaRPr lang="en-US" sz="2400" dirty="0"/>
-          </a:p>
-        </p:txBody>
-      </p:sp>
-    </p:spTree>
-    <p:extLst>
-      <p:ext uri="{BB962C8B-B14F-4D97-AF65-F5344CB8AC3E}">
-        <p14:creationId xmlns:p14="http://schemas.microsoft.com/office/powerpoint/2010/main" val="1630327796"/>
-      </p:ext>
-    </p:extLst>
-  </p:cSld>
-  <p:clrMapOvr>
-    <a:masterClrMapping/>
-  </p:clrMapOvr>
-  <p:timing>
-    <p:tnLst>
-      <p:par>
-        <p:cTn id="1" dur="indefinite" restart="never" nodeType="tmRoot">
-          <p:childTnLst>
-            <p:seq concurrent="1" nextAc="seek">
-              <p:cTn id="2" dur="indefinite" nodeType="mainSeq">
-                <p:childTnLst>
-                  <p:par>
-                    <p:cTn id="3" fill="hold">
-                      <p:stCondLst>
-                        <p:cond delay="indefinite"/>
-                      </p:stCondLst>
-                      <p:childTnLst>
-                        <p:par>
-                          <p:cTn id="4" fill="hold">
-                            <p:stCondLst>
-                              <p:cond delay="0"/>
-                            </p:stCondLst>
-                            <p:childTnLst>
-                              <p:par>
-                                <p:cTn id="5" presetID="1" presetClass="entr" presetSubtype="0" fill="hold" nodeType="clickEffect">
-                                  <p:stCondLst>
-                                    <p:cond delay="0"/>
-                                  </p:stCondLst>
-                                  <p:childTnLst>
-                                    <p:set>
-                                      <p:cBhvr>
-                                        <p:cTn id="6" dur="1" fill="hold">
-                                          <p:stCondLst>
-                                            <p:cond delay="0"/>
-                                          </p:stCondLst>
-                                        </p:cTn>
-                                        <p:tgtEl>
-                                          <p:spTgt spid="4">
-                                            <p:txEl>
-                                              <p:pRg st="0" end="0"/>
-                                            </p:txEl>
-                                          </p:spTgt>
-                                        </p:tgtEl>
-                                        <p:attrNameLst>
-                                          <p:attrName>style.visibility</p:attrName>
-                                        </p:attrNameLst>
-                                      </p:cBhvr>
-                                      <p:to>
-                                        <p:strVal val="visible"/>
-                                      </p:to>
-                                    </p:set>
-                                  </p:childTnLst>
-                                </p:cTn>
-                              </p:par>
-                            </p:childTnLst>
-                          </p:cTn>
-                        </p:par>
-                      </p:childTnLst>
-                    </p:cTn>
-                  </p:par>
-                  <p:par>
-                    <p:cTn id="7" fill="hold">
-                      <p:stCondLst>
-                        <p:cond delay="indefinite"/>
-                      </p:stCondLst>
-                      <p:childTnLst>
-                        <p:par>
-                          <p:cTn id="8" fill="hold">
-                            <p:stCondLst>
-                              <p:cond delay="0"/>
-                            </p:stCondLst>
-                            <p:childTnLst>
-                              <p:par>
-                                <p:cTn id="9" presetID="1" presetClass="entr" presetSubtype="0" fill="hold" nodeType="clickEffect">
-                                  <p:stCondLst>
-                                    <p:cond delay="0"/>
-                                  </p:stCondLst>
-                                  <p:childTnLst>
-                                    <p:set>
-                                      <p:cBhvr>
-                                        <p:cTn id="10" dur="1" fill="hold">
-                                          <p:stCondLst>
-                                            <p:cond delay="0"/>
-                                          </p:stCondLst>
-                                        </p:cTn>
-                                        <p:tgtEl>
-                                          <p:spTgt spid="4">
-                                            <p:txEl>
-                                              <p:pRg st="1" end="1"/>
-                                            </p:txEl>
-                                          </p:spTgt>
-                                        </p:tgtEl>
-                                        <p:attrNameLst>
-                                          <p:attrName>style.visibility</p:attrName>
-                                        </p:attrNameLst>
-                                      </p:cBhvr>
-                                      <p:to>
-                                        <p:strVal val="visible"/>
-                                      </p:to>
-                                    </p:set>
-                                  </p:childTnLst>
-                                </p:cTn>
-                              </p:par>
-                            </p:childTnLst>
-                          </p:cTn>
-                        </p:par>
-                      </p:childTnLst>
-                    </p:cTn>
-                  </p:par>
-                  <p:par>
-                    <p:cTn id="11" fill="hold">
-                      <p:stCondLst>
-                        <p:cond delay="indefinite"/>
-                      </p:stCondLst>
-                      <p:childTnLst>
-                        <p:par>
-                          <p:cTn id="12" fill="hold">
-                            <p:stCondLst>
-                              <p:cond delay="0"/>
-                            </p:stCondLst>
-                            <p:childTnLst>
-                              <p:par>
-                                <p:cTn id="13" presetID="1" presetClass="entr" presetSubtype="0" fill="hold" nodeType="clickEffect">
-                                  <p:stCondLst>
-                                    <p:cond delay="0"/>
-                                  </p:stCondLst>
-                                  <p:childTnLst>
-                                    <p:set>
-                                      <p:cBhvr>
-                                        <p:cTn id="14" dur="1" fill="hold">
-                                          <p:stCondLst>
-                                            <p:cond delay="0"/>
-                                          </p:stCondLst>
-                                        </p:cTn>
-                                        <p:tgtEl>
-                                          <p:spTgt spid="4">
-                                            <p:txEl>
-                                              <p:pRg st="2" end="2"/>
-                                            </p:txEl>
-                                          </p:spTgt>
-                                        </p:tgtEl>
-                                        <p:attrNameLst>
-                                          <p:attrName>style.visibility</p:attrName>
-                                        </p:attrNameLst>
-                                      </p:cBhvr>
-                                      <p:to>
-                                        <p:strVal val="visible"/>
-                                      </p:to>
-                                    </p:set>
-                                  </p:childTnLst>
-                                </p:cTn>
-                              </p:par>
-                            </p:childTnLst>
-                          </p:cTn>
-                        </p:par>
-                      </p:childTnLst>
-                    </p:cTn>
-                  </p:par>
-                  <p:par>
-                    <p:cTn id="15" fill="hold">
-                      <p:stCondLst>
-                        <p:cond delay="indefinite"/>
-                      </p:stCondLst>
-                      <p:childTnLst>
-                        <p:par>
-                          <p:cTn id="16" fill="hold">
-                            <p:stCondLst>
-                              <p:cond delay="0"/>
-                            </p:stCondLst>
-                            <p:childTnLst>
-                              <p:par>
-                                <p:cTn id="17" presetID="1" presetClass="entr" presetSubtype="0" fill="hold" nodeType="clickEffect">
-                                  <p:stCondLst>
-                                    <p:cond delay="0"/>
-                                  </p:stCondLst>
-                                  <p:childTnLst>
-                                    <p:set>
-                                      <p:cBhvr>
-                                        <p:cTn id="18" dur="1" fill="hold">
-                                          <p:stCondLst>
-                                            <p:cond delay="0"/>
-                                          </p:stCondLst>
-                                        </p:cTn>
-                                        <p:tgtEl>
-                                          <p:spTgt spid="4">
-                                            <p:txEl>
-                                              <p:pRg st="4" end="4"/>
-                                            </p:txEl>
-                                          </p:spTgt>
-                                        </p:tgtEl>
-                                        <p:attrNameLst>
-                                          <p:attrName>style.visibility</p:attrName>
-                                        </p:attrNameLst>
-                                      </p:cBhvr>
-                                      <p:to>
-                                        <p:strVal val="visible"/>
-                                      </p:to>
-                                    </p:set>
-                                  </p:childTnLst>
-                                </p:cTn>
-                              </p:par>
-                            </p:childTnLst>
-                          </p:cTn>
-                        </p:par>
-                      </p:childTnLst>
-                    </p:cTn>
-                  </p:par>
-                  <p:par>
-                    <p:cTn id="19" fill="hold">
-                      <p:stCondLst>
-                        <p:cond delay="indefinite"/>
-                      </p:stCondLst>
-                      <p:childTnLst>
-                        <p:par>
-                          <p:cTn id="20" fill="hold">
-                            <p:stCondLst>
-                              <p:cond delay="0"/>
-                            </p:stCondLst>
-                            <p:childTnLst>
-                              <p:par>
-                                <p:cTn id="21" presetID="1" presetClass="entr" presetSubtype="0" fill="hold" nodeType="clickEffect">
-                                  <p:stCondLst>
-                                    <p:cond delay="0"/>
-                                  </p:stCondLst>
-                                  <p:childTnLst>
-                                    <p:set>
-                                      <p:cBhvr>
-                                        <p:cTn id="22" dur="1" fill="hold">
-                                          <p:stCondLst>
-                                            <p:cond delay="0"/>
-                                          </p:stCondLst>
-                                        </p:cTn>
-                                        <p:tgtEl>
-                                          <p:spTgt spid="4">
-                                            <p:txEl>
-                                              <p:pRg st="5" end="5"/>
-                                            </p:txEl>
-                                          </p:spTgt>
-                                        </p:tgtEl>
-                                        <p:attrNameLst>
-                                          <p:attrName>style.visibility</p:attrName>
-                                        </p:attrNameLst>
-                                      </p:cBhvr>
-                                      <p:to>
-                                        <p:strVal val="visible"/>
-                                      </p:to>
-                                    </p:set>
-                                  </p:childTnLst>
-                                </p:cTn>
-                              </p:par>
-                            </p:childTnLst>
-                          </p:cTn>
-                        </p:par>
-                      </p:childTnLst>
-                    </p:cTn>
-                  </p:par>
-                  <p:par>
-                    <p:cTn id="23" fill="hold">
-                      <p:stCondLst>
-                        <p:cond delay="indefinite"/>
-                      </p:stCondLst>
-                      <p:childTnLst>
-                        <p:par>
-                          <p:cTn id="24" fill="hold">
-                            <p:stCondLst>
-                              <p:cond delay="0"/>
-                            </p:stCondLst>
-                            <p:childTnLst>
-                              <p:par>
-                                <p:cTn id="25" presetID="1" presetClass="entr" presetSubtype="0" fill="hold" nodeType="clickEffect">
-                                  <p:stCondLst>
-                                    <p:cond delay="0"/>
-                                  </p:stCondLst>
-                                  <p:childTnLst>
-                                    <p:set>
-                                      <p:cBhvr>
-                                        <p:cTn id="26" dur="1" fill="hold">
-                                          <p:stCondLst>
-                                            <p:cond delay="0"/>
-                                          </p:stCondLst>
-                                        </p:cTn>
-                                        <p:tgtEl>
-                                          <p:spTgt spid="4">
-                                            <p:txEl>
-                                              <p:pRg st="6" end="6"/>
-                                            </p:txEl>
-                                          </p:spTgt>
-                                        </p:tgtEl>
-                                        <p:attrNameLst>
-                                          <p:attrName>style.visibility</p:attrName>
-                                        </p:attrNameLst>
-                                      </p:cBhvr>
-                                      <p:to>
-                                        <p:strVal val="visible"/>
-                                      </p:to>
-                                    </p:set>
-                                  </p:childTnLst>
-                                </p:cTn>
-                              </p:par>
-                            </p:childTnLst>
-                          </p:cTn>
-                        </p:par>
-                      </p:childTnLst>
-                    </p:cTn>
-                  </p:par>
-                  <p:par>
-                    <p:cTn id="27" fill="hold">
-                      <p:stCondLst>
-                        <p:cond delay="indefinite"/>
-                      </p:stCondLst>
-                      <p:childTnLst>
-                        <p:par>
-                          <p:cTn id="28" fill="hold">
-                            <p:stCondLst>
-                              <p:cond delay="0"/>
-                            </p:stCondLst>
-                            <p:childTnLst>
-                              <p:par>
-                                <p:cTn id="29" presetID="1" presetClass="entr" presetSubtype="0" fill="hold" nodeType="clickEffect">
-                                  <p:stCondLst>
-                                    <p:cond delay="0"/>
-                                  </p:stCondLst>
-                                  <p:childTnLst>
-                                    <p:set>
-                                      <p:cBhvr>
-                                        <p:cTn id="30" dur="1" fill="hold">
-                                          <p:stCondLst>
-                                            <p:cond delay="0"/>
-                                          </p:stCondLst>
-                                        </p:cTn>
-                                        <p:tgtEl>
-                                          <p:spTgt spid="4">
-                                            <p:txEl>
-                                              <p:pRg st="7" end="7"/>
-                                            </p:txEl>
-                                          </p:spTgt>
-                                        </p:tgtEl>
-                                        <p:attrNameLst>
-                                          <p:attrName>style.visibility</p:attrName>
-                                        </p:attrNameLst>
-                                      </p:cBhvr>
-                                      <p:to>
-                                        <p:strVal val="visible"/>
-                                      </p:to>
-                                    </p:set>
-                                  </p:childTnLst>
-                                </p:cTn>
-                              </p:par>
-                            </p:childTnLst>
-                          </p:cTn>
-                        </p:par>
-                      </p:childTnLst>
-                    </p:cTn>
-                  </p:par>
-                  <p:par>
-                    <p:cTn id="31" fill="hold">
-                      <p:stCondLst>
-                        <p:cond delay="indefinite"/>
-                      </p:stCondLst>
-                      <p:childTnLst>
-                        <p:par>
-                          <p:cTn id="32" fill="hold">
-                            <p:stCondLst>
-                              <p:cond delay="0"/>
-                            </p:stCondLst>
-                            <p:childTnLst>
-                              <p:par>
-                                <p:cTn id="33" presetID="1" presetClass="entr" presetSubtype="0" fill="hold" nodeType="clickEffect">
-                                  <p:stCondLst>
-                                    <p:cond delay="0"/>
-                                  </p:stCondLst>
-                                  <p:childTnLst>
-                                    <p:set>
-                                      <p:cBhvr>
-                                        <p:cTn id="34" dur="1" fill="hold">
-                                          <p:stCondLst>
-                                            <p:cond delay="0"/>
-                                          </p:stCondLst>
-                                        </p:cTn>
-                                        <p:tgtEl>
-                                          <p:spTgt spid="4">
-                                            <p:txEl>
-                                              <p:pRg st="8" end="8"/>
-                                            </p:txEl>
-                                          </p:spTgt>
-                                        </p:tgtEl>
-                                        <p:attrNameLst>
-                                          <p:attrName>style.visibility</p:attrName>
-                                        </p:attrNameLst>
-                                      </p:cBhvr>
-                                      <p:to>
-                                        <p:strVal val="visible"/>
-                                      </p:to>
-                                    </p:set>
-                                  </p:childTnLst>
-                                </p:cTn>
-                              </p:par>
-                            </p:childTnLst>
-                          </p:cTn>
-                        </p:par>
-                      </p:childTnLst>
-                    </p:cTn>
-                  </p:par>
-                  <p:par>
-                    <p:cTn id="35" fill="hold">
-                      <p:stCondLst>
-                        <p:cond delay="indefinite"/>
-                      </p:stCondLst>
-                      <p:childTnLst>
-                        <p:par>
-                          <p:cTn id="36" fill="hold">
-                            <p:stCondLst>
-                              <p:cond delay="0"/>
-                            </p:stCondLst>
-                            <p:childTnLst>
-                              <p:par>
-                                <p:cTn id="37" presetID="1" presetClass="entr" presetSubtype="0" fill="hold" nodeType="clickEffect">
-                                  <p:stCondLst>
-                                    <p:cond delay="0"/>
-                                  </p:stCondLst>
-                                  <p:childTnLst>
-                                    <p:set>
-                                      <p:cBhvr>
-                                        <p:cTn id="38" dur="1" fill="hold">
-                                          <p:stCondLst>
-                                            <p:cond delay="0"/>
-                                          </p:stCondLst>
-                                        </p:cTn>
-                                        <p:tgtEl>
-                                          <p:spTgt spid="4">
-                                            <p:txEl>
-                                              <p:pRg st="9" end="9"/>
-                                            </p:txEl>
-                                          </p:spTgt>
-                                        </p:tgtEl>
-                                        <p:attrNameLst>
-                                          <p:attrName>style.visibility</p:attrName>
-                                        </p:attrNameLst>
-                                      </p:cBhvr>
-                                      <p:to>
-                                        <p:strVal val="visible"/>
-                                      </p:to>
-                                    </p:set>
-                                  </p:childTnLst>
-                                </p:cTn>
-                              </p:par>
-                            </p:childTnLst>
-                          </p:cTn>
-                        </p:par>
-                      </p:childTnLst>
-                    </p:cTn>
-                  </p:par>
-                  <p:par>
-                    <p:cTn id="39" fill="hold">
-                      <p:stCondLst>
-                        <p:cond delay="indefinite"/>
-                      </p:stCondLst>
-                      <p:childTnLst>
-                        <p:par>
-                          <p:cTn id="40" fill="hold">
-                            <p:stCondLst>
-                              <p:cond delay="0"/>
-                            </p:stCondLst>
-                            <p:childTnLst>
-                              <p:par>
-                                <p:cTn id="41" presetID="1" presetClass="entr" presetSubtype="0" fill="hold" nodeType="clickEffect">
-                                  <p:stCondLst>
-                                    <p:cond delay="0"/>
-                                  </p:stCondLst>
-                                  <p:childTnLst>
-                                    <p:set>
-                                      <p:cBhvr>
-                                        <p:cTn id="42" dur="1" fill="hold">
-                                          <p:stCondLst>
-                                            <p:cond delay="0"/>
-                                          </p:stCondLst>
-                                        </p:cTn>
-                                        <p:tgtEl>
-                                          <p:spTgt spid="4">
-                                            <p:txEl>
-                                              <p:pRg st="10" end="10"/>
-                                            </p:txEl>
-                                          </p:spTgt>
-                                        </p:tgtEl>
-                                        <p:attrNameLst>
-                                          <p:attrName>style.visibility</p:attrName>
-                                        </p:attrNameLst>
-                                      </p:cBhvr>
-                                      <p:to>
-                                        <p:strVal val="visible"/>
-                                      </p:to>
-                                    </p:set>
-                                  </p:childTnLst>
-                                </p:cTn>
-                              </p:par>
-                            </p:childTnLst>
-                          </p:cTn>
-                        </p:par>
-                      </p:childTnLst>
-                    </p:cTn>
-                  </p:par>
-                  <p:par>
-                    <p:cTn id="43" fill="hold">
-                      <p:stCondLst>
-                        <p:cond delay="indefinite"/>
-                      </p:stCondLst>
-                      <p:childTnLst>
-                        <p:par>
-                          <p:cTn id="44" fill="hold">
-                            <p:stCondLst>
-                              <p:cond delay="0"/>
-                            </p:stCondLst>
-                            <p:childTnLst>
-                              <p:par>
-                                <p:cTn id="45" presetID="1" presetClass="entr" presetSubtype="0" fill="hold" nodeType="clickEffect">
-                                  <p:stCondLst>
-                                    <p:cond delay="0"/>
-                                  </p:stCondLst>
-                                  <p:childTnLst>
-                                    <p:set>
-                                      <p:cBhvr>
-                                        <p:cTn id="46" dur="1" fill="hold">
-                                          <p:stCondLst>
-                                            <p:cond delay="0"/>
-                                          </p:stCondLst>
-                                        </p:cTn>
-                                        <p:tgtEl>
-                                          <p:spTgt spid="4">
-                                            <p:txEl>
-                                              <p:pRg st="11" end="11"/>
-                                            </p:txEl>
-                                          </p:spTgt>
-                                        </p:tgtEl>
-                                        <p:attrNameLst>
-                                          <p:attrName>style.visibility</p:attrName>
-                                        </p:attrNameLst>
-                                      </p:cBhvr>
-                                      <p:to>
-                                        <p:strVal val="visible"/>
-                                      </p:to>
-                                    </p:set>
-                                  </p:childTnLst>
-                                </p:cTn>
-                              </p:par>
-                            </p:childTnLst>
-                          </p:cTn>
-                        </p:par>
-                      </p:childTnLst>
-                    </p:cTn>
-                  </p:par>
-                  <p:par>
-                    <p:cTn id="47" fill="hold">
-                      <p:stCondLst>
-                        <p:cond delay="indefinite"/>
-                      </p:stCondLst>
-                      <p:childTnLst>
-                        <p:par>
-                          <p:cTn id="48" fill="hold">
-                            <p:stCondLst>
-                              <p:cond delay="0"/>
-                            </p:stCondLst>
-                            <p:childTnLst>
-                              <p:par>
-                                <p:cTn id="49" presetID="1" presetClass="entr" presetSubtype="0" fill="hold" nodeType="clickEffect">
-                                  <p:stCondLst>
-                                    <p:cond delay="0"/>
-                                  </p:stCondLst>
-                                  <p:childTnLst>
-                                    <p:set>
-                                      <p:cBhvr>
-                                        <p:cTn id="50" dur="1" fill="hold">
-                                          <p:stCondLst>
-                                            <p:cond delay="0"/>
-                                          </p:stCondLst>
-                                        </p:cTn>
-                                        <p:tgtEl>
-                                          <p:spTgt spid="4">
-                                            <p:txEl>
-                                              <p:pRg st="12" end="12"/>
-                                            </p:txEl>
-                                          </p:spTgt>
-                                        </p:tgtEl>
-                                        <p:attrNameLst>
-                                          <p:attrName>style.visibility</p:attrName>
-                                        </p:attrNameLst>
-                                      </p:cBhvr>
-                                      <p:to>
-                                        <p:strVal val="visible"/>
-                                      </p:to>
-                                    </p:set>
-                                  </p:childTnLst>
-                                </p:cTn>
-                              </p:par>
-                            </p:childTnLst>
-                          </p:cTn>
-                        </p:par>
-                      </p:childTnLst>
-                    </p:cTn>
-                  </p:par>
-                  <p:par>
-                    <p:cTn id="51" fill="hold">
-                      <p:stCondLst>
-                        <p:cond delay="indefinite"/>
-                      </p:stCondLst>
-                      <p:childTnLst>
-                        <p:par>
-                          <p:cTn id="52" fill="hold">
-                            <p:stCondLst>
-                              <p:cond delay="0"/>
-                            </p:stCondLst>
-                            <p:childTnLst>
-                              <p:par>
-                                <p:cTn id="53" presetID="1" presetClass="entr" presetSubtype="0" fill="hold" nodeType="clickEffect">
-                                  <p:stCondLst>
-                                    <p:cond delay="0"/>
-                                  </p:stCondLst>
-                                  <p:childTnLst>
-                                    <p:set>
-                                      <p:cBhvr>
-                                        <p:cTn id="54" dur="1" fill="hold">
-                                          <p:stCondLst>
-                                            <p:cond delay="0"/>
-                                          </p:stCondLst>
-                                        </p:cTn>
-                                        <p:tgtEl>
-                                          <p:spTgt spid="4">
-                                            <p:txEl>
-                                              <p:pRg st="13" end="13"/>
-                                            </p:txEl>
-                                          </p:spTgt>
-                                        </p:tgtEl>
-                                        <p:attrNameLst>
-                                          <p:attrName>style.visibility</p:attrName>
-                                        </p:attrNameLst>
-                                      </p:cBhvr>
-                                      <p:to>
-                                        <p:strVal val="visible"/>
-                                      </p:to>
-                                    </p:set>
-                                  </p:childTnLst>
-                                </p:cTn>
-                              </p:par>
-                            </p:childTnLst>
-                          </p:cTn>
-                        </p:par>
-                      </p:childTnLst>
-                    </p:cTn>
-                  </p:par>
-                  <p:par>
-                    <p:cTn id="55" fill="hold">
-                      <p:stCondLst>
-                        <p:cond delay="indefinite"/>
-                      </p:stCondLst>
-                      <p:childTnLst>
-                        <p:par>
-                          <p:cTn id="56" fill="hold">
-                            <p:stCondLst>
-                              <p:cond delay="0"/>
-                            </p:stCondLst>
-                            <p:childTnLst>
-                              <p:par>
-                                <p:cTn id="57" presetID="1" presetClass="entr" presetSubtype="0" fill="hold" nodeType="clickEffect">
-                                  <p:stCondLst>
-                                    <p:cond delay="0"/>
-                                  </p:stCondLst>
-                                  <p:childTnLst>
-                                    <p:set>
-                                      <p:cBhvr>
-                                        <p:cTn id="58" dur="1" fill="hold">
-                                          <p:stCondLst>
-                                            <p:cond delay="0"/>
-                                          </p:stCondLst>
-                                        </p:cTn>
-                                        <p:tgtEl>
-                                          <p:spTgt spid="4">
-                                            <p:txEl>
-                                              <p:pRg st="14" end="14"/>
-                                            </p:txEl>
-                                          </p:spTgt>
-                                        </p:tgtEl>
-                                        <p:attrNameLst>
-                                          <p:attrName>style.visibility</p:attrName>
-                                        </p:attrNameLst>
-                                      </p:cBhvr>
-                                      <p:to>
-                                        <p:strVal val="visible"/>
-                                      </p:to>
-                                    </p:set>
-                                  </p:childTnLst>
-                                </p:cTn>
-                              </p:par>
-                            </p:childTnLst>
-                          </p:cTn>
-                        </p:par>
-                      </p:childTnLst>
-                    </p:cTn>
-                  </p:par>
-                  <p:par>
-                    <p:cTn id="59" fill="hold">
-                      <p:stCondLst>
-                        <p:cond delay="indefinite"/>
-                      </p:stCondLst>
-                      <p:childTnLst>
-                        <p:par>
-                          <p:cTn id="60" fill="hold">
-                            <p:stCondLst>
-                              <p:cond delay="0"/>
-                            </p:stCondLst>
-                            <p:childTnLst>
-                              <p:par>
-                                <p:cTn id="61" presetID="1" presetClass="entr" presetSubtype="0" fill="hold" nodeType="clickEffect">
-                                  <p:stCondLst>
-                                    <p:cond delay="0"/>
-                                  </p:stCondLst>
-                                  <p:childTnLst>
-                                    <p:set>
-                                      <p:cBhvr>
-                                        <p:cTn id="62" dur="1" fill="hold">
-                                          <p:stCondLst>
-                                            <p:cond delay="0"/>
-                                          </p:stCondLst>
-                                        </p:cTn>
-                                        <p:tgtEl>
-                                          <p:spTgt spid="4">
-                                            <p:txEl>
-                                              <p:pRg st="15" end="15"/>
-                                            </p:txEl>
-                                          </p:spTgt>
-                                        </p:tgtEl>
-                                        <p:attrNameLst>
-                                          <p:attrName>style.visibility</p:attrName>
-                                        </p:attrNameLst>
-                                      </p:cBhvr>
-                                      <p:to>
-                                        <p:strVal val="visible"/>
-                                      </p:to>
-                                    </p:set>
-                                  </p:childTnLst>
-                                </p:cTn>
-                              </p:par>
-                            </p:childTnLst>
-                          </p:cTn>
-                        </p:par>
-                      </p:childTnLst>
-                    </p:cTn>
-                  </p:par>
-                  <p:par>
-                    <p:cTn id="63" fill="hold">
-                      <p:stCondLst>
-                        <p:cond delay="indefinite"/>
-                      </p:stCondLst>
-                      <p:childTnLst>
-                        <p:par>
-                          <p:cTn id="64" fill="hold">
-                            <p:stCondLst>
-                              <p:cond delay="0"/>
-                            </p:stCondLst>
-                            <p:childTnLst>
-                              <p:par>
-                                <p:cTn id="65" presetID="1" presetClass="entr" presetSubtype="0" fill="hold" nodeType="clickEffect">
-                                  <p:stCondLst>
-                                    <p:cond delay="0"/>
-                                  </p:stCondLst>
-                                  <p:childTnLst>
-                                    <p:set>
-                                      <p:cBhvr>
-                                        <p:cTn id="66" dur="1" fill="hold">
-                                          <p:stCondLst>
-                                            <p:cond delay="0"/>
-                                          </p:stCondLst>
-                                        </p:cTn>
-                                        <p:tgtEl>
-                                          <p:spTgt spid="4">
-                                            <p:txEl>
-                                              <p:pRg st="16" end="16"/>
-                                            </p:txEl>
-                                          </p:spTgt>
-                                        </p:tgtEl>
-                                        <p:attrNameLst>
-                                          <p:attrName>style.visibility</p:attrName>
-                                        </p:attrNameLst>
-                                      </p:cBhvr>
-                                      <p:to>
-                                        <p:strVal val="visible"/>
-                                      </p:to>
-                                    </p:set>
-                                  </p:childTnLst>
-                                </p:cTn>
-                              </p:par>
-                            </p:childTnLst>
-                          </p:cTn>
-                        </p:par>
-                      </p:childTnLst>
-                    </p:cTn>
-                  </p:par>
-                  <p:par>
-                    <p:cTn id="67" fill="hold">
-                      <p:stCondLst>
-                        <p:cond delay="indefinite"/>
-                      </p:stCondLst>
-                      <p:childTnLst>
-                        <p:par>
-                          <p:cTn id="68" fill="hold">
-                            <p:stCondLst>
-                              <p:cond delay="0"/>
-                            </p:stCondLst>
-                            <p:childTnLst>
-                              <p:par>
-                                <p:cTn id="69" presetID="1" presetClass="entr" presetSubtype="0" fill="hold" nodeType="clickEffect">
-                                  <p:stCondLst>
-                                    <p:cond delay="0"/>
-                                  </p:stCondLst>
-                                  <p:childTnLst>
-                                    <p:set>
-                                      <p:cBhvr>
-                                        <p:cTn id="70" dur="1" fill="hold">
-                                          <p:stCondLst>
-                                            <p:cond delay="0"/>
-                                          </p:stCondLst>
-                                        </p:cTn>
-                                        <p:tgtEl>
-                                          <p:spTgt spid="4">
-                                            <p:txEl>
-                                              <p:pRg st="18" end="18"/>
-                                            </p:txEl>
-                                          </p:spTgt>
-                                        </p:tgtEl>
-                                        <p:attrNameLst>
-                                          <p:attrName>style.visibility</p:attrName>
-                                        </p:attrNameLst>
-                                      </p:cBhvr>
-                                      <p:to>
-                                        <p:strVal val="visible"/>
-                                      </p:to>
-                                    </p:set>
-                                  </p:childTnLst>
-                                </p:cTn>
-                              </p:par>
-                            </p:childTnLst>
-                          </p:cTn>
-                        </p:par>
-                      </p:childTnLst>
-                    </p:cTn>
-                  </p:par>
-                  <p:par>
-                    <p:cTn id="71" fill="hold">
-                      <p:stCondLst>
-                        <p:cond delay="indefinite"/>
-                      </p:stCondLst>
-                      <p:childTnLst>
-                        <p:par>
-                          <p:cTn id="72" fill="hold">
-                            <p:stCondLst>
-                              <p:cond delay="0"/>
-                            </p:stCondLst>
-                            <p:childTnLst>
-                              <p:par>
-                                <p:cTn id="73" presetID="1" presetClass="entr" presetSubtype="0" fill="hold" nodeType="clickEffect">
-                                  <p:stCondLst>
-                                    <p:cond delay="0"/>
-                                  </p:stCondLst>
-                                  <p:childTnLst>
-                                    <p:set>
-                                      <p:cBhvr>
-                                        <p:cTn id="74" dur="1" fill="hold">
-                                          <p:stCondLst>
-                                            <p:cond delay="0"/>
-                                          </p:stCondLst>
-                                        </p:cTn>
-                                        <p:tgtEl>
-                                          <p:spTgt spid="4">
-                                            <p:txEl>
-                                              <p:pRg st="19" end="19"/>
-                                            </p:txEl>
-                                          </p:spTgt>
-                                        </p:tgtEl>
-                                        <p:attrNameLst>
-                                          <p:attrName>style.visibility</p:attrName>
-                                        </p:attrNameLst>
-                                      </p:cBhvr>
-                                      <p:to>
-                                        <p:strVal val="visible"/>
-                                      </p:to>
-                                    </p:set>
-                                  </p:childTnLst>
-                                </p:cTn>
-                              </p:par>
-                            </p:childTnLst>
-                          </p:cTn>
-                        </p:par>
-                      </p:childTnLst>
-                    </p:cTn>
-                  </p:par>
-                  <p:par>
-                    <p:cTn id="75" fill="hold">
-                      <p:stCondLst>
-                        <p:cond delay="indefinite"/>
-                      </p:stCondLst>
-                      <p:childTnLst>
-                        <p:par>
-                          <p:cTn id="76" fill="hold">
-                            <p:stCondLst>
-                              <p:cond delay="0"/>
-                            </p:stCondLst>
-                            <p:childTnLst>
-                              <p:par>
-                                <p:cTn id="77" presetID="1" presetClass="entr" presetSubtype="0" fill="hold" nodeType="clickEffect">
-                                  <p:stCondLst>
-                                    <p:cond delay="0"/>
-                                  </p:stCondLst>
-                                  <p:childTnLst>
-                                    <p:set>
-                                      <p:cBhvr>
-                                        <p:cTn id="78" dur="1" fill="hold">
-                                          <p:stCondLst>
-                                            <p:cond delay="0"/>
-                                          </p:stCondLst>
-                                        </p:cTn>
-                                        <p:tgtEl>
-                                          <p:spTgt spid="4">
-                                            <p:txEl>
-                                              <p:pRg st="20" end="20"/>
-                                            </p:txEl>
-                                          </p:spTgt>
-                                        </p:tgtEl>
-                                        <p:attrNameLst>
-                                          <p:attrName>style.visibility</p:attrName>
-                                        </p:attrNameLst>
-                                      </p:cBhvr>
-                                      <p:to>
-                                        <p:strVal val="visible"/>
-                                      </p:to>
-                                    </p:set>
-                                  </p:childTnLst>
-                                </p:cTn>
-                              </p:par>
-                            </p:childTnLst>
-                          </p:cTn>
-                        </p:par>
-                      </p:childTnLst>
-                    </p:cTn>
-                  </p:par>
-                </p:childTnLst>
-              </p:cTn>
-              <p:prevCondLst>
-                <p:cond evt="onPrev" delay="0">
-                  <p:tgtEl>
-                    <p:sldTgt/>
-                  </p:tgtEl>
-                </p:cond>
-              </p:prevCondLst>
-              <p:nextCondLst>
-                <p:cond evt="onNext" delay="0">
-                  <p:tgtEl>
-                    <p:sldTgt/>
-                  </p:tgtEl>
-                </p:cond>
-              </p:nextCondLst>
-            </p:seq>
-          </p:childTnLst>
-        </p:cTn>
-      </p:par>
-    </p:tnLst>
-  </p:timing>
 </p:sld>
 </file>
 
@@ -4936,7 +3913,7 @@
         </p:nvSpPr>
         <p:spPr>
           <a:xfrm>
-            <a:off x="366318" y="427839"/>
+            <a:off x="433430" y="-310392"/>
             <a:ext cx="10472257" cy="3236053"/>
           </a:xfrm>
         </p:spPr>
@@ -4952,7 +3929,10 @@
             <a:br>
               <a:rPr lang="en-US" dirty="0"/>
             </a:br>
-            <a:endParaRPr lang="en-US" dirty="0"/>
+            <a:r>
+              <a:rPr lang="en-US" dirty="0"/>
+              <a:t>MATH 135: Lecture 3</a:t>
+            </a:r>
           </a:p>
         </p:txBody>
       </p:sp>
@@ -4974,242 +3954,31 @@
         </p:nvSpPr>
         <p:spPr>
           <a:xfrm>
-            <a:off x="1030446" y="8483"/>
-            <a:ext cx="9144000" cy="827349"/>
+            <a:off x="1038835" y="3518148"/>
+            <a:ext cx="9144000" cy="1655762"/>
           </a:xfrm>
         </p:spPr>
         <p:txBody>
-          <a:bodyPr>
-            <a:normAutofit/>
-          </a:bodyPr>
-          <a:lstStyle/>
-          <a:p>
-            <a:r>
-              <a:rPr lang="en-US" sz="4400" u="sng" dirty="0"/>
-              <a:t>Upcoming responsibilities!</a:t>
-            </a:r>
-          </a:p>
-        </p:txBody>
-      </p:sp>
-      <p:sp>
-        <p:nvSpPr>
-          <p:cNvPr id="4" name="TextBox 3">
-            <a:extLst>
-              <a:ext uri="{FF2B5EF4-FFF2-40B4-BE49-F238E27FC236}">
-                <a16:creationId xmlns:a16="http://schemas.microsoft.com/office/drawing/2014/main" id="{0E4E45B2-07CC-43F3-92B9-C70644650306}"/>
-              </a:ext>
-            </a:extLst>
-          </p:cNvPr>
-          <p:cNvSpPr txBox="1"/>
-          <p:nvPr/>
-        </p:nvSpPr>
-        <p:spPr>
-          <a:xfrm>
-            <a:off x="366318" y="598766"/>
-            <a:ext cx="11330732" cy="7048083"/>
-          </a:xfrm>
-          <a:prstGeom prst="rect">
-            <a:avLst/>
-          </a:prstGeom>
-          <a:noFill/>
-        </p:spPr>
-        <p:txBody>
-          <a:bodyPr wrap="square" rtlCol="0">
-            <a:spAutoFit/>
-          </a:bodyPr>
-          <a:lstStyle/>
-          <a:p>
-            <a:pPr marL="285750" indent="-285750">
-              <a:buFont typeface="Arial" panose="020B0604020202020204" pitchFamily="34" charset="0"/>
-              <a:buChar char="•"/>
-            </a:pPr>
-            <a:endParaRPr lang="en-US" sz="800" dirty="0"/>
-          </a:p>
-          <a:p>
-            <a:pPr marL="285750" indent="-285750">
-              <a:buFont typeface="Arial" panose="020B0604020202020204" pitchFamily="34" charset="0"/>
-              <a:buChar char="•"/>
-            </a:pPr>
-            <a:r>
-              <a:rPr lang="en-US" sz="3200" u="sng" dirty="0"/>
-              <a:t>Monday 13 September:</a:t>
-            </a:r>
-          </a:p>
-          <a:p>
-            <a:pPr marL="742950" lvl="1" indent="-285750">
-              <a:buFont typeface="Arial" panose="020B0604020202020204" pitchFamily="34" charset="0"/>
-              <a:buChar char="•"/>
-            </a:pPr>
-            <a:r>
-              <a:rPr lang="en-US" sz="3200" dirty="0"/>
-              <a:t>Complete Mobius Quiz 1: MQ1</a:t>
-            </a:r>
-          </a:p>
-          <a:p>
-            <a:pPr marL="285750" indent="-285750">
-              <a:buFont typeface="Arial" panose="020B0604020202020204" pitchFamily="34" charset="0"/>
-              <a:buChar char="•"/>
-            </a:pPr>
-            <a:endParaRPr lang="en-US" sz="200" dirty="0"/>
-          </a:p>
-          <a:p>
-            <a:pPr marL="285750" indent="-285750">
-              <a:buFont typeface="Arial" panose="020B0604020202020204" pitchFamily="34" charset="0"/>
-              <a:buChar char="•"/>
-            </a:pPr>
-            <a:r>
-              <a:rPr lang="en-US" sz="3200" u="sng" dirty="0"/>
-              <a:t>Wednesday 15 September:</a:t>
-            </a:r>
-          </a:p>
-          <a:p>
-            <a:pPr marL="742950" lvl="1" indent="-285750">
-              <a:buFont typeface="Arial" panose="020B0604020202020204" pitchFamily="34" charset="0"/>
-              <a:buChar char="•"/>
-            </a:pPr>
-            <a:r>
-              <a:rPr lang="en-US" sz="3200" dirty="0"/>
-              <a:t>Complete Mobius Quiz 2: MQ2</a:t>
-            </a:r>
-          </a:p>
-          <a:p>
-            <a:pPr marL="285750" indent="-285750">
-              <a:buFont typeface="Arial" panose="020B0604020202020204" pitchFamily="34" charset="0"/>
-              <a:buChar char="•"/>
-            </a:pPr>
-            <a:endParaRPr lang="en-US" sz="200" dirty="0"/>
-          </a:p>
-          <a:p>
-            <a:pPr marL="285750" indent="-285750">
-              <a:buFont typeface="Arial" panose="020B0604020202020204" pitchFamily="34" charset="0"/>
-              <a:buChar char="•"/>
-            </a:pPr>
-            <a:r>
-              <a:rPr lang="en-US" sz="3200" b="1" u="sng" dirty="0">
-                <a:solidFill>
-                  <a:srgbClr val="FF0000"/>
-                </a:solidFill>
-              </a:rPr>
-              <a:t>Wednesday 15 September 5PM:</a:t>
-            </a:r>
-          </a:p>
-          <a:p>
-            <a:pPr marL="742950" lvl="1" indent="-285750">
-              <a:buFont typeface="Arial" panose="020B0604020202020204" pitchFamily="34" charset="0"/>
-              <a:buChar char="•"/>
-            </a:pPr>
-            <a:r>
-              <a:rPr lang="en-US" sz="3200" b="1" dirty="0">
-                <a:solidFill>
-                  <a:srgbClr val="FF0000"/>
-                </a:solidFill>
-              </a:rPr>
-              <a:t>Complete first Written Assignment (WA)</a:t>
-            </a:r>
-          </a:p>
-          <a:p>
-            <a:pPr marL="742950" lvl="1" indent="-285750">
-              <a:buFont typeface="Arial" panose="020B0604020202020204" pitchFamily="34" charset="0"/>
-              <a:buChar char="•"/>
-            </a:pPr>
-            <a:endParaRPr lang="en-US" sz="200" b="1" dirty="0">
-              <a:solidFill>
-                <a:srgbClr val="FF0000"/>
-              </a:solidFill>
-            </a:endParaRPr>
-          </a:p>
-          <a:p>
-            <a:pPr marL="285750" indent="-285750">
-              <a:buFont typeface="Arial" panose="020B0604020202020204" pitchFamily="34" charset="0"/>
-              <a:buChar char="•"/>
-            </a:pPr>
-            <a:r>
-              <a:rPr lang="en-US" sz="3200" u="sng" dirty="0"/>
-              <a:t>Friday 17 September 2PM:</a:t>
-            </a:r>
-          </a:p>
-          <a:p>
-            <a:pPr marL="742950" lvl="1" indent="-285750">
-              <a:buFont typeface="Arial" panose="020B0604020202020204" pitchFamily="34" charset="0"/>
-              <a:buChar char="•"/>
-            </a:pPr>
-            <a:r>
-              <a:rPr lang="en-US" sz="3200" dirty="0"/>
-              <a:t>Complete reading Chapter 2 of the course notes</a:t>
-            </a:r>
-          </a:p>
-          <a:p>
-            <a:pPr marL="285750" indent="-285750">
-              <a:buFont typeface="Arial" panose="020B0604020202020204" pitchFamily="34" charset="0"/>
-              <a:buChar char="•"/>
-            </a:pPr>
-            <a:r>
-              <a:rPr lang="en-US" sz="3200" u="sng" dirty="0"/>
-              <a:t>Friday 17 September:</a:t>
-            </a:r>
-          </a:p>
-          <a:p>
-            <a:pPr marL="742950" lvl="1" indent="-285750">
-              <a:buFont typeface="Arial" panose="020B0604020202020204" pitchFamily="34" charset="0"/>
-              <a:buChar char="•"/>
-            </a:pPr>
-            <a:r>
-              <a:rPr lang="en-US" sz="3200" dirty="0"/>
-              <a:t>Complete Mobius Quiz 3: MQ3</a:t>
-            </a:r>
-          </a:p>
-          <a:p>
-            <a:pPr marL="742950" lvl="1" indent="-285750">
-              <a:buFont typeface="Arial" panose="020B0604020202020204" pitchFamily="34" charset="0"/>
-              <a:buChar char="•"/>
-            </a:pPr>
-            <a:endParaRPr lang="en-US" sz="200" b="1" dirty="0">
-              <a:solidFill>
-                <a:srgbClr val="FF0000"/>
-              </a:solidFill>
-            </a:endParaRPr>
-          </a:p>
-          <a:p>
-            <a:pPr marL="285750" indent="-285750">
-              <a:buFont typeface="Arial" panose="020B0604020202020204" pitchFamily="34" charset="0"/>
-              <a:buChar char="•"/>
-            </a:pPr>
-            <a:r>
-              <a:rPr lang="en-US" sz="3200" u="sng" dirty="0"/>
-              <a:t>Sunday 19 September:</a:t>
-            </a:r>
-          </a:p>
-          <a:p>
-            <a:pPr marL="742950" lvl="1" indent="-285750">
-              <a:buFont typeface="Arial" panose="020B0604020202020204" pitchFamily="34" charset="0"/>
-              <a:buChar char="•"/>
-            </a:pPr>
-            <a:r>
-              <a:rPr lang="en-US" sz="3200" dirty="0"/>
-              <a:t>Complete reading up to the end of Section 0.2 (Polynomials)</a:t>
-            </a:r>
-          </a:p>
-          <a:p>
-            <a:pPr lvl="1"/>
-            <a:endParaRPr lang="en-US" sz="2400" dirty="0"/>
-          </a:p>
-          <a:p>
-            <a:pPr marL="742950" lvl="1" indent="-285750">
-              <a:buFont typeface="Arial" panose="020B0604020202020204" pitchFamily="34" charset="0"/>
-              <a:buChar char="•"/>
-            </a:pPr>
-            <a:endParaRPr lang="en-US" sz="2800" b="1" dirty="0">
-              <a:solidFill>
-                <a:srgbClr val="FF0000"/>
-              </a:solidFill>
-            </a:endParaRPr>
+          <a:bodyPr/>
+          <a:lstStyle/>
+          <a:p>
+            <a:r>
+              <a:rPr lang="en-US" sz="4000" dirty="0"/>
+              <a:t>Dr. Nike Dattani</a:t>
+            </a:r>
+          </a:p>
+          <a:p>
+            <a:r>
+              <a:rPr lang="en-US" dirty="0"/>
+              <a:t>13 September 2021</a:t>
+            </a:r>
           </a:p>
         </p:txBody>
       </p:sp>
     </p:spTree>
     <p:extLst>
       <p:ext uri="{BB962C8B-B14F-4D97-AF65-F5344CB8AC3E}">
-        <p14:creationId xmlns:p14="http://schemas.microsoft.com/office/powerpoint/2010/main" val="783963905"/>
+        <p14:creationId xmlns:p14="http://schemas.microsoft.com/office/powerpoint/2010/main" val="2485455611"/>
       </p:ext>
     </p:extLst>
   </p:cSld>
@@ -5292,6 +4061,324 @@
         </p:nvSpPr>
         <p:spPr>
           <a:xfrm>
+            <a:off x="1030446" y="8483"/>
+            <a:ext cx="9144000" cy="827349"/>
+          </a:xfrm>
+        </p:spPr>
+        <p:txBody>
+          <a:bodyPr>
+            <a:normAutofit/>
+          </a:bodyPr>
+          <a:lstStyle/>
+          <a:p>
+            <a:r>
+              <a:rPr lang="en-US" sz="4400" u="sng" dirty="0"/>
+              <a:t>Upcoming responsibilities!</a:t>
+            </a:r>
+          </a:p>
+        </p:txBody>
+      </p:sp>
+      <p:sp>
+        <p:nvSpPr>
+          <p:cNvPr id="4" name="TextBox 3">
+            <a:extLst>
+              <a:ext uri="{FF2B5EF4-FFF2-40B4-BE49-F238E27FC236}">
+                <a16:creationId xmlns:a16="http://schemas.microsoft.com/office/drawing/2014/main" id="{0E4E45B2-07CC-43F3-92B9-C70644650306}"/>
+              </a:ext>
+            </a:extLst>
+          </p:cNvPr>
+          <p:cNvSpPr txBox="1"/>
+          <p:nvPr/>
+        </p:nvSpPr>
+        <p:spPr>
+          <a:xfrm>
+            <a:off x="366318" y="598766"/>
+            <a:ext cx="11330732" cy="7048083"/>
+          </a:xfrm>
+          <a:prstGeom prst="rect">
+            <a:avLst/>
+          </a:prstGeom>
+          <a:noFill/>
+        </p:spPr>
+        <p:txBody>
+          <a:bodyPr wrap="square" rtlCol="0">
+            <a:spAutoFit/>
+          </a:bodyPr>
+          <a:lstStyle/>
+          <a:p>
+            <a:pPr marL="285750" indent="-285750">
+              <a:buFont typeface="Arial" panose="020B0604020202020204" pitchFamily="34" charset="0"/>
+              <a:buChar char="•"/>
+            </a:pPr>
+            <a:endParaRPr lang="en-US" sz="800" dirty="0"/>
+          </a:p>
+          <a:p>
+            <a:pPr marL="285750" indent="-285750">
+              <a:buFont typeface="Arial" panose="020B0604020202020204" pitchFamily="34" charset="0"/>
+              <a:buChar char="•"/>
+            </a:pPr>
+            <a:r>
+              <a:rPr lang="en-US" sz="3200" u="sng" dirty="0"/>
+              <a:t>Monday 13 September:</a:t>
+            </a:r>
+          </a:p>
+          <a:p>
+            <a:pPr marL="742950" lvl="1" indent="-285750">
+              <a:buFont typeface="Arial" panose="020B0604020202020204" pitchFamily="34" charset="0"/>
+              <a:buChar char="•"/>
+            </a:pPr>
+            <a:r>
+              <a:rPr lang="en-US" sz="3200" dirty="0"/>
+              <a:t>Complete Mobius Quiz 1: MQ1</a:t>
+            </a:r>
+          </a:p>
+          <a:p>
+            <a:pPr marL="285750" indent="-285750">
+              <a:buFont typeface="Arial" panose="020B0604020202020204" pitchFamily="34" charset="0"/>
+              <a:buChar char="•"/>
+            </a:pPr>
+            <a:endParaRPr lang="en-US" sz="200" dirty="0"/>
+          </a:p>
+          <a:p>
+            <a:pPr marL="285750" indent="-285750">
+              <a:buFont typeface="Arial" panose="020B0604020202020204" pitchFamily="34" charset="0"/>
+              <a:buChar char="•"/>
+            </a:pPr>
+            <a:r>
+              <a:rPr lang="en-US" sz="3200" u="sng" dirty="0"/>
+              <a:t>Wednesday 15 September:</a:t>
+            </a:r>
+          </a:p>
+          <a:p>
+            <a:pPr marL="742950" lvl="1" indent="-285750">
+              <a:buFont typeface="Arial" panose="020B0604020202020204" pitchFamily="34" charset="0"/>
+              <a:buChar char="•"/>
+            </a:pPr>
+            <a:r>
+              <a:rPr lang="en-US" sz="3200" dirty="0"/>
+              <a:t>Complete Mobius Quiz 2: MQ2</a:t>
+            </a:r>
+          </a:p>
+          <a:p>
+            <a:pPr marL="285750" indent="-285750">
+              <a:buFont typeface="Arial" panose="020B0604020202020204" pitchFamily="34" charset="0"/>
+              <a:buChar char="•"/>
+            </a:pPr>
+            <a:endParaRPr lang="en-US" sz="200" dirty="0"/>
+          </a:p>
+          <a:p>
+            <a:pPr marL="285750" indent="-285750">
+              <a:buFont typeface="Arial" panose="020B0604020202020204" pitchFamily="34" charset="0"/>
+              <a:buChar char="•"/>
+            </a:pPr>
+            <a:r>
+              <a:rPr lang="en-US" sz="3200" b="1" u="sng" dirty="0">
+                <a:solidFill>
+                  <a:srgbClr val="FF0000"/>
+                </a:solidFill>
+              </a:rPr>
+              <a:t>Wednesday 15 September 5PM:</a:t>
+            </a:r>
+          </a:p>
+          <a:p>
+            <a:pPr marL="742950" lvl="1" indent="-285750">
+              <a:buFont typeface="Arial" panose="020B0604020202020204" pitchFamily="34" charset="0"/>
+              <a:buChar char="•"/>
+            </a:pPr>
+            <a:r>
+              <a:rPr lang="en-US" sz="3200" b="1" dirty="0">
+                <a:solidFill>
+                  <a:srgbClr val="FF0000"/>
+                </a:solidFill>
+              </a:rPr>
+              <a:t>Complete first Written Assignment (WA)</a:t>
+            </a:r>
+          </a:p>
+          <a:p>
+            <a:pPr marL="742950" lvl="1" indent="-285750">
+              <a:buFont typeface="Arial" panose="020B0604020202020204" pitchFamily="34" charset="0"/>
+              <a:buChar char="•"/>
+            </a:pPr>
+            <a:endParaRPr lang="en-US" sz="200" b="1" dirty="0">
+              <a:solidFill>
+                <a:srgbClr val="FF0000"/>
+              </a:solidFill>
+            </a:endParaRPr>
+          </a:p>
+          <a:p>
+            <a:pPr marL="285750" indent="-285750">
+              <a:buFont typeface="Arial" panose="020B0604020202020204" pitchFamily="34" charset="0"/>
+              <a:buChar char="•"/>
+            </a:pPr>
+            <a:r>
+              <a:rPr lang="en-US" sz="3200" u="sng" dirty="0"/>
+              <a:t>Friday 17 September 2PM:</a:t>
+            </a:r>
+          </a:p>
+          <a:p>
+            <a:pPr marL="742950" lvl="1" indent="-285750">
+              <a:buFont typeface="Arial" panose="020B0604020202020204" pitchFamily="34" charset="0"/>
+              <a:buChar char="•"/>
+            </a:pPr>
+            <a:r>
+              <a:rPr lang="en-US" sz="3200" dirty="0"/>
+              <a:t>Complete reading Chapter 2 of the course notes</a:t>
+            </a:r>
+          </a:p>
+          <a:p>
+            <a:pPr marL="285750" indent="-285750">
+              <a:buFont typeface="Arial" panose="020B0604020202020204" pitchFamily="34" charset="0"/>
+              <a:buChar char="•"/>
+            </a:pPr>
+            <a:r>
+              <a:rPr lang="en-US" sz="3200" u="sng" dirty="0"/>
+              <a:t>Friday 17 September:</a:t>
+            </a:r>
+          </a:p>
+          <a:p>
+            <a:pPr marL="742950" lvl="1" indent="-285750">
+              <a:buFont typeface="Arial" panose="020B0604020202020204" pitchFamily="34" charset="0"/>
+              <a:buChar char="•"/>
+            </a:pPr>
+            <a:r>
+              <a:rPr lang="en-US" sz="3200" dirty="0"/>
+              <a:t>Complete Mobius Quiz 3: MQ3</a:t>
+            </a:r>
+          </a:p>
+          <a:p>
+            <a:pPr marL="742950" lvl="1" indent="-285750">
+              <a:buFont typeface="Arial" panose="020B0604020202020204" pitchFamily="34" charset="0"/>
+              <a:buChar char="•"/>
+            </a:pPr>
+            <a:endParaRPr lang="en-US" sz="200" b="1" dirty="0">
+              <a:solidFill>
+                <a:srgbClr val="FF0000"/>
+              </a:solidFill>
+            </a:endParaRPr>
+          </a:p>
+          <a:p>
+            <a:pPr marL="285750" indent="-285750">
+              <a:buFont typeface="Arial" panose="020B0604020202020204" pitchFamily="34" charset="0"/>
+              <a:buChar char="•"/>
+            </a:pPr>
+            <a:r>
+              <a:rPr lang="en-US" sz="3200" u="sng" dirty="0"/>
+              <a:t>Sunday 19 September:</a:t>
+            </a:r>
+          </a:p>
+          <a:p>
+            <a:pPr marL="742950" lvl="1" indent="-285750">
+              <a:buFont typeface="Arial" panose="020B0604020202020204" pitchFamily="34" charset="0"/>
+              <a:buChar char="•"/>
+            </a:pPr>
+            <a:r>
+              <a:rPr lang="en-US" sz="3200" dirty="0"/>
+              <a:t>Complete reading up to the end of Section 0.2 (Polynomials)</a:t>
+            </a:r>
+          </a:p>
+          <a:p>
+            <a:pPr lvl="1"/>
+            <a:endParaRPr lang="en-US" sz="2400" dirty="0"/>
+          </a:p>
+          <a:p>
+            <a:pPr marL="742950" lvl="1" indent="-285750">
+              <a:buFont typeface="Arial" panose="020B0604020202020204" pitchFamily="34" charset="0"/>
+              <a:buChar char="•"/>
+            </a:pPr>
+            <a:endParaRPr lang="en-US" sz="2800" b="1" dirty="0">
+              <a:solidFill>
+                <a:srgbClr val="FF0000"/>
+              </a:solidFill>
+            </a:endParaRPr>
+          </a:p>
+        </p:txBody>
+      </p:sp>
+    </p:spTree>
+    <p:extLst>
+      <p:ext uri="{BB962C8B-B14F-4D97-AF65-F5344CB8AC3E}">
+        <p14:creationId xmlns:p14="http://schemas.microsoft.com/office/powerpoint/2010/main" val="783963905"/>
+      </p:ext>
+    </p:extLst>
+  </p:cSld>
+  <p:clrMapOvr>
+    <a:masterClrMapping/>
+  </p:clrMapOvr>
+</p:sld>
+</file>
+
+<file path=ppt/slides/slide4.xml><?xml version="1.0" encoding="utf-8"?>
+<p:sld xmlns:a="http://schemas.openxmlformats.org/drawingml/2006/main" xmlns:r="http://schemas.openxmlformats.org/officeDocument/2006/relationships" xmlns:p="http://schemas.openxmlformats.org/presentationml/2006/main">
+  <p:cSld>
+    <p:spTree>
+      <p:nvGrpSpPr>
+        <p:cNvPr id="1" name=""/>
+        <p:cNvGrpSpPr/>
+        <p:nvPr/>
+      </p:nvGrpSpPr>
+      <p:grpSpPr>
+        <a:xfrm>
+          <a:off x="0" y="0"/>
+          <a:ext cx="0" cy="0"/>
+          <a:chOff x="0" y="0"/>
+          <a:chExt cx="0" cy="0"/>
+        </a:xfrm>
+      </p:grpSpPr>
+      <p:sp>
+        <p:nvSpPr>
+          <p:cNvPr id="2" name="Title 1">
+            <a:extLst>
+              <a:ext uri="{FF2B5EF4-FFF2-40B4-BE49-F238E27FC236}">
+                <a16:creationId xmlns:a16="http://schemas.microsoft.com/office/drawing/2014/main" id="{3DFDFE6E-0F70-4498-A727-114AF49CE2A5}"/>
+              </a:ext>
+            </a:extLst>
+          </p:cNvPr>
+          <p:cNvSpPr>
+            <a:spLocks noGrp="1"/>
+          </p:cNvSpPr>
+          <p:nvPr>
+            <p:ph type="ctrTitle"/>
+          </p:nvPr>
+        </p:nvSpPr>
+        <p:spPr>
+          <a:xfrm>
+            <a:off x="366318" y="427839"/>
+            <a:ext cx="10472257" cy="3236053"/>
+          </a:xfrm>
+        </p:spPr>
+        <p:txBody>
+          <a:bodyPr>
+            <a:normAutofit/>
+          </a:bodyPr>
+          <a:lstStyle/>
+          <a:p>
+            <a:br>
+              <a:rPr lang="en-US" dirty="0"/>
+            </a:br>
+            <a:br>
+              <a:rPr lang="en-US" dirty="0"/>
+            </a:br>
+            <a:endParaRPr lang="en-US" dirty="0"/>
+          </a:p>
+        </p:txBody>
+      </p:sp>
+      <p:sp>
+        <p:nvSpPr>
+          <p:cNvPr id="3" name="Subtitle 2">
+            <a:extLst>
+              <a:ext uri="{FF2B5EF4-FFF2-40B4-BE49-F238E27FC236}">
+                <a16:creationId xmlns:a16="http://schemas.microsoft.com/office/drawing/2014/main" id="{B9191896-C725-462F-BB08-4D8D8507E31D}"/>
+              </a:ext>
+            </a:extLst>
+          </p:cNvPr>
+          <p:cNvSpPr>
+            <a:spLocks noGrp="1"/>
+          </p:cNvSpPr>
+          <p:nvPr>
+            <p:ph type="subTitle" idx="1"/>
+          </p:nvPr>
+        </p:nvSpPr>
+        <p:spPr>
+          <a:xfrm>
             <a:off x="159391" y="85471"/>
             <a:ext cx="11785133" cy="827349"/>
           </a:xfrm>
@@ -5392,7 +4479,15 @@
           <a:p>
             <a:r>
               <a:rPr lang="en-US" sz="2400" dirty="0"/>
-              <a:t>Ɐ N,  ∃ a </a:t>
+              <a:t>Ɐ N </a:t>
+            </a:r>
+            <a:r>
+              <a:rPr lang="el-GR" sz="2400" dirty="0"/>
+              <a:t>ϵ</a:t>
+            </a:r>
+            <a:r>
+              <a:rPr lang="en-US" sz="2400" dirty="0"/>
+              <a:t> S,  ∃ a </a:t>
             </a:r>
             <a:r>
               <a:rPr lang="el-GR" sz="2400" dirty="0"/>
@@ -5613,6 +4708,35 @@
           </a:fontRef>
         </p:style>
       </p:cxnSp>
+      <p:sp>
+        <p:nvSpPr>
+          <p:cNvPr id="5" name="Footer Placeholder 4">
+            <a:extLst>
+              <a:ext uri="{FF2B5EF4-FFF2-40B4-BE49-F238E27FC236}">
+                <a16:creationId xmlns:a16="http://schemas.microsoft.com/office/drawing/2014/main" id="{52C4E7FD-108C-44D1-AA58-099130C35B79}"/>
+              </a:ext>
+            </a:extLst>
+          </p:cNvPr>
+          <p:cNvSpPr>
+            <a:spLocks noGrp="1"/>
+          </p:cNvSpPr>
+          <p:nvPr>
+            <p:ph type="ftr" sz="quarter" idx="11"/>
+          </p:nvPr>
+        </p:nvSpPr>
+        <p:spPr/>
+        <p:txBody>
+          <a:bodyPr/>
+          <a:lstStyle/>
+          <a:p>
+            <a:r>
+              <a:rPr lang="sv-SE"/>
+              <a:t>Dr. Nike Dattani, MATH 135, Fall 2021</a:t>
+            </a:r>
+            <a:endParaRPr lang="en-US"/>
+          </a:p>
+        </p:txBody>
+      </p:sp>
     </p:spTree>
     <p:extLst>
       <p:ext uri="{BB962C8B-B14F-4D97-AF65-F5344CB8AC3E}">
@@ -5931,7 +5055,7 @@
                                         <p:tgtEl>
                                           <p:spTgt spid="4">
                                             <p:txEl>
-                                              <p:pRg st="9" end="9"/>
+                                              <p:pRg st="10" end="10"/>
                                             </p:txEl>
                                           </p:spTgt>
                                         </p:tgtEl>
@@ -5980,7 +5104,7 @@
                                         <p:tgtEl>
                                           <p:spTgt spid="4">
                                             <p:txEl>
-                                              <p:pRg st="10" end="10"/>
+                                              <p:pRg st="12" end="12"/>
                                             </p:txEl>
                                           </p:spTgt>
                                         </p:tgtEl>
@@ -6022,55 +5146,6 @@
                                     <p:set>
                                       <p:cBhvr>
                                         <p:cTn id="36" dur="1" fill="hold">
-                                          <p:stCondLst>
-                                            <p:cond delay="0"/>
-                                          </p:stCondLst>
-                                        </p:cTn>
-                                        <p:tgtEl>
-                                          <p:spTgt spid="4">
-                                            <p:txEl>
-                                              <p:pRg st="12" end="12"/>
-                                            </p:txEl>
-                                          </p:spTgt>
-                                        </p:tgtEl>
-                                        <p:attrNameLst>
-                                          <p:attrName>style.visibility</p:attrName>
-                                        </p:attrNameLst>
-                                      </p:cBhvr>
-                                      <p:to>
-                                        <p:strVal val="visible"/>
-                                      </p:to>
-                                    </p:set>
-                                  </p:childTnLst>
-                                </p:cTn>
-                              </p:par>
-                            </p:childTnLst>
-                          </p:cTn>
-                        </p:par>
-                      </p:childTnLst>
-                    </p:cTn>
-                  </p:par>
-                  <p:par>
-                    <p:cTn id="37" fill="hold">
-                      <p:stCondLst>
-                        <p:cond delay="indefinite"/>
-                      </p:stCondLst>
-                      <p:childTnLst>
-                        <p:par>
-                          <p:cTn id="38" fill="hold">
-                            <p:stCondLst>
-                              <p:cond delay="0"/>
-                            </p:stCondLst>
-                            <p:childTnLst>
-                              <p:par>
-                                <p:cTn id="39" presetID="1" presetClass="entr" presetSubtype="0" fill="hold" nodeType="clickEffect">
-                                  <p:stCondLst>
-                                    <p:cond delay="0"/>
-                                  </p:stCondLst>
-                                  <p:childTnLst>
-                                    <p:set>
-                                      <p:cBhvr>
-                                        <p:cTn id="40" dur="1" fill="hold">
                                           <p:stCondLst>
                                             <p:cond delay="0"/>
                                           </p:stCondLst>
@@ -6124,116 +5199,6 @@
 </p:sld>
 </file>
 
-<file path=ppt/slides/slide4.xml><?xml version="1.0" encoding="utf-8"?>
-<p:sld xmlns:a="http://schemas.openxmlformats.org/drawingml/2006/main" xmlns:r="http://schemas.openxmlformats.org/officeDocument/2006/relationships" xmlns:p="http://schemas.openxmlformats.org/presentationml/2006/main">
-  <p:cSld>
-    <p:spTree>
-      <p:nvGrpSpPr>
-        <p:cNvPr id="1" name=""/>
-        <p:cNvGrpSpPr/>
-        <p:nvPr/>
-      </p:nvGrpSpPr>
-      <p:grpSpPr>
-        <a:xfrm>
-          <a:off x="0" y="0"/>
-          <a:ext cx="0" cy="0"/>
-          <a:chOff x="0" y="0"/>
-          <a:chExt cx="0" cy="0"/>
-        </a:xfrm>
-      </p:grpSpPr>
-      <p:sp>
-        <p:nvSpPr>
-          <p:cNvPr id="2" name="Title 1">
-            <a:extLst>
-              <a:ext uri="{FF2B5EF4-FFF2-40B4-BE49-F238E27FC236}">
-                <a16:creationId xmlns:a16="http://schemas.microsoft.com/office/drawing/2014/main" id="{3DFDFE6E-0F70-4498-A727-114AF49CE2A5}"/>
-              </a:ext>
-            </a:extLst>
-          </p:cNvPr>
-          <p:cNvSpPr>
-            <a:spLocks noGrp="1"/>
-          </p:cNvSpPr>
-          <p:nvPr>
-            <p:ph type="ctrTitle"/>
-          </p:nvPr>
-        </p:nvSpPr>
-        <p:spPr>
-          <a:xfrm>
-            <a:off x="433430" y="-310392"/>
-            <a:ext cx="10472257" cy="3236053"/>
-          </a:xfrm>
-        </p:spPr>
-        <p:txBody>
-          <a:bodyPr>
-            <a:normAutofit/>
-          </a:bodyPr>
-          <a:lstStyle/>
-          <a:p>
-            <a:br>
-              <a:rPr lang="en-US" dirty="0"/>
-            </a:br>
-            <a:br>
-              <a:rPr lang="en-US" dirty="0"/>
-            </a:br>
-            <a:r>
-              <a:rPr lang="en-US" dirty="0"/>
-              <a:t>MATH 135: Lecture 3</a:t>
-            </a:r>
-          </a:p>
-        </p:txBody>
-      </p:sp>
-      <p:sp>
-        <p:nvSpPr>
-          <p:cNvPr id="3" name="Subtitle 2">
-            <a:extLst>
-              <a:ext uri="{FF2B5EF4-FFF2-40B4-BE49-F238E27FC236}">
-                <a16:creationId xmlns:a16="http://schemas.microsoft.com/office/drawing/2014/main" id="{B9191896-C725-462F-BB08-4D8D8507E31D}"/>
-              </a:ext>
-            </a:extLst>
-          </p:cNvPr>
-          <p:cNvSpPr>
-            <a:spLocks noGrp="1"/>
-          </p:cNvSpPr>
-          <p:nvPr>
-            <p:ph type="subTitle" idx="1"/>
-          </p:nvPr>
-        </p:nvSpPr>
-        <p:spPr>
-          <a:xfrm>
-            <a:off x="1038835" y="3518148"/>
-            <a:ext cx="9144000" cy="1655762"/>
-          </a:xfrm>
-        </p:spPr>
-        <p:txBody>
-          <a:bodyPr/>
-          <a:lstStyle/>
-          <a:p>
-            <a:r>
-              <a:rPr lang="en-US" sz="4000" dirty="0"/>
-              <a:t>Dr. Nike Dattani</a:t>
-            </a:r>
-          </a:p>
-          <a:p>
-            <a:r>
-              <a:rPr lang="en-US" dirty="0"/>
-              <a:t>10 September 2021</a:t>
-            </a:r>
-          </a:p>
-        </p:txBody>
-      </p:sp>
-    </p:spTree>
-    <p:extLst>
-      <p:ext uri="{BB962C8B-B14F-4D97-AF65-F5344CB8AC3E}">
-        <p14:creationId xmlns:p14="http://schemas.microsoft.com/office/powerpoint/2010/main" val="2485455611"/>
-      </p:ext>
-    </p:extLst>
-  </p:cSld>
-  <p:clrMapOvr>
-    <a:masterClrMapping/>
-  </p:clrMapOvr>
-</p:sld>
-</file>
-
 <file path=ppt/slides/slide5.xml><?xml version="1.0" encoding="utf-8"?>
 <p:sld xmlns:a="http://schemas.openxmlformats.org/drawingml/2006/main" xmlns:r="http://schemas.openxmlformats.org/officeDocument/2006/relationships" xmlns:p="http://schemas.openxmlformats.org/presentationml/2006/main">
   <p:cSld>
@@ -6393,7 +5358,7 @@
           <a:p>
             <a:r>
               <a:rPr lang="en-US" sz="4400" u="sng" dirty="0"/>
-              <a:t>Tips for Assignment 1!</a:t>
+              <a:t>Assignment 1!</a:t>
             </a:r>
           </a:p>
         </p:txBody>
@@ -6535,6 +5500,35 @@
           </a:prstGeom>
         </p:spPr>
       </p:pic>
+      <p:sp>
+        <p:nvSpPr>
+          <p:cNvPr id="2" name="Footer Placeholder 1">
+            <a:extLst>
+              <a:ext uri="{FF2B5EF4-FFF2-40B4-BE49-F238E27FC236}">
+                <a16:creationId xmlns:a16="http://schemas.microsoft.com/office/drawing/2014/main" id="{EBBF4E0E-646C-4E85-AFFE-935F2A0A197A}"/>
+              </a:ext>
+            </a:extLst>
+          </p:cNvPr>
+          <p:cNvSpPr>
+            <a:spLocks noGrp="1"/>
+          </p:cNvSpPr>
+          <p:nvPr>
+            <p:ph type="ftr" sz="quarter" idx="11"/>
+          </p:nvPr>
+        </p:nvSpPr>
+        <p:spPr/>
+        <p:txBody>
+          <a:bodyPr/>
+          <a:lstStyle/>
+          <a:p>
+            <a:r>
+              <a:rPr lang="sv-SE"/>
+              <a:t>Dr. Nike Dattani, MATH 135, Fall 2021</a:t>
+            </a:r>
+            <a:endParaRPr lang="en-US"/>
+          </a:p>
+        </p:txBody>
+      </p:sp>
     </p:spTree>
     <p:extLst>
       <p:ext uri="{BB962C8B-B14F-4D97-AF65-F5344CB8AC3E}">
@@ -6766,7 +5760,7 @@
           <a:p>
             <a:r>
               <a:rPr lang="en-US" sz="4400" u="sng" dirty="0"/>
-              <a:t>Tips for Assignment 1!</a:t>
+              <a:t>Assignment 1!</a:t>
             </a:r>
           </a:p>
         </p:txBody>
@@ -6890,6 +5884,35 @@
                 <a:srgbClr val="FF0000"/>
               </a:solidFill>
             </a:endParaRPr>
+          </a:p>
+        </p:txBody>
+      </p:sp>
+      <p:sp>
+        <p:nvSpPr>
+          <p:cNvPr id="5" name="Footer Placeholder 4">
+            <a:extLst>
+              <a:ext uri="{FF2B5EF4-FFF2-40B4-BE49-F238E27FC236}">
+                <a16:creationId xmlns:a16="http://schemas.microsoft.com/office/drawing/2014/main" id="{4677BD1D-783E-459B-B531-88DBC767E010}"/>
+              </a:ext>
+            </a:extLst>
+          </p:cNvPr>
+          <p:cNvSpPr>
+            <a:spLocks noGrp="1"/>
+          </p:cNvSpPr>
+          <p:nvPr>
+            <p:ph type="ftr" sz="quarter" idx="11"/>
+          </p:nvPr>
+        </p:nvSpPr>
+        <p:spPr/>
+        <p:txBody>
+          <a:bodyPr/>
+          <a:lstStyle/>
+          <a:p>
+            <a:r>
+              <a:rPr lang="sv-SE"/>
+              <a:t>Dr. Nike Dattani, MATH 135, Fall 2021</a:t>
+            </a:r>
+            <a:endParaRPr lang="en-US"/>
           </a:p>
         </p:txBody>
       </p:sp>
@@ -7081,7 +6104,7 @@
           <a:p>
             <a:r>
               <a:rPr lang="en-US" sz="4400" u="sng" dirty="0"/>
-              <a:t>Tips for Question 4!</a:t>
+              <a:t>Question 4</a:t>
             </a:r>
           </a:p>
         </p:txBody>
@@ -7101,7 +6124,7 @@
         <p:spPr>
           <a:xfrm>
             <a:off x="374073" y="912820"/>
-            <a:ext cx="13456226" cy="5786199"/>
+            <a:ext cx="13456226" cy="4801314"/>
           </a:xfrm>
           <a:prstGeom prst="rect">
             <a:avLst/>
@@ -7193,21 +6216,36 @@
           </a:p>
           <a:p>
             <a:pPr lvl="1"/>
-            <a:r>
-              <a:rPr lang="en-US" sz="3200" dirty="0"/>
-              <a:t>A and B are logically equivalent if A is true when B is true</a:t>
-            </a:r>
-          </a:p>
-          <a:p>
-            <a:pPr lvl="1"/>
-            <a:r>
-              <a:rPr lang="en-US" sz="3200" dirty="0"/>
-              <a:t>AND also A is false when B is false.</a:t>
-            </a:r>
-          </a:p>
-          <a:p>
-            <a:pPr lvl="1"/>
             <a:endParaRPr lang="en-US" sz="3200" dirty="0"/>
+          </a:p>
+        </p:txBody>
+      </p:sp>
+      <p:sp>
+        <p:nvSpPr>
+          <p:cNvPr id="2" name="Footer Placeholder 1">
+            <a:extLst>
+              <a:ext uri="{FF2B5EF4-FFF2-40B4-BE49-F238E27FC236}">
+                <a16:creationId xmlns:a16="http://schemas.microsoft.com/office/drawing/2014/main" id="{D3F6FF0F-F58D-494B-A2E3-694B91EB6CEC}"/>
+              </a:ext>
+            </a:extLst>
+          </p:cNvPr>
+          <p:cNvSpPr>
+            <a:spLocks noGrp="1"/>
+          </p:cNvSpPr>
+          <p:nvPr>
+            <p:ph type="ftr" sz="quarter" idx="11"/>
+          </p:nvPr>
+        </p:nvSpPr>
+        <p:spPr/>
+        <p:txBody>
+          <a:bodyPr/>
+          <a:lstStyle/>
+          <a:p>
+            <a:r>
+              <a:rPr lang="sv-SE"/>
+              <a:t>Dr. Nike Dattani, MATH 135, Fall 2021</a:t>
+            </a:r>
+            <a:endParaRPr lang="en-US"/>
           </a:p>
         </p:txBody>
       </p:sp>
@@ -7358,86 +6396,6 @@
                       </p:childTnLst>
                     </p:cTn>
                   </p:par>
-                  <p:par>
-                    <p:cTn id="13" fill="hold">
-                      <p:stCondLst>
-                        <p:cond delay="indefinite"/>
-                      </p:stCondLst>
-                      <p:childTnLst>
-                        <p:par>
-                          <p:cTn id="14" fill="hold">
-                            <p:stCondLst>
-                              <p:cond delay="0"/>
-                            </p:stCondLst>
-                            <p:childTnLst>
-                              <p:par>
-                                <p:cTn id="15" presetID="1" presetClass="entr" presetSubtype="0" fill="hold" nodeType="clickEffect">
-                                  <p:stCondLst>
-                                    <p:cond delay="0"/>
-                                  </p:stCondLst>
-                                  <p:childTnLst>
-                                    <p:set>
-                                      <p:cBhvr>
-                                        <p:cTn id="16" dur="1" fill="hold">
-                                          <p:stCondLst>
-                                            <p:cond delay="0"/>
-                                          </p:stCondLst>
-                                        </p:cTn>
-                                        <p:tgtEl>
-                                          <p:spTgt spid="5">
-                                            <p:txEl>
-                                              <p:pRg st="12" end="12"/>
-                                            </p:txEl>
-                                          </p:spTgt>
-                                        </p:tgtEl>
-                                        <p:attrNameLst>
-                                          <p:attrName>style.visibility</p:attrName>
-                                        </p:attrNameLst>
-                                      </p:cBhvr>
-                                      <p:to>
-                                        <p:strVal val="visible"/>
-                                      </p:to>
-                                    </p:set>
-                                  </p:childTnLst>
-                                </p:cTn>
-                              </p:par>
-                              <p:par>
-                                <p:cTn id="17" presetID="1" presetClass="entr" presetSubtype="0" fill="hold" nodeType="withEffect">
-                                  <p:stCondLst>
-                                    <p:cond delay="0"/>
-                                  </p:stCondLst>
-                                  <p:childTnLst>
-                                    <p:set>
-                                      <p:cBhvr>
-                                        <p:cTn id="18" dur="1" fill="hold">
-                                          <p:stCondLst>
-                                            <p:cond delay="0"/>
-                                          </p:stCondLst>
-                                        </p:cTn>
-                                        <p:tgtEl>
-                                          <p:spTgt spid="5">
-                                            <p:txEl>
-                                              <p:pRg st="13" end="13"/>
-                                            </p:txEl>
-                                          </p:spTgt>
-                                        </p:tgtEl>
-                                        <p:attrNameLst>
-                                          <p:attrName>style.visibility</p:attrName>
-                                        </p:attrNameLst>
-                                      </p:cBhvr>
-                                      <p:to>
-                                        <p:strVal val="visible"/>
-                                      </p:to>
-                                    </p:set>
-                                  </p:childTnLst>
-                                </p:cTn>
-                              </p:par>
-                            </p:childTnLst>
-                          </p:cTn>
-                        </p:par>
-                      </p:childTnLst>
-                    </p:cTn>
-                  </p:par>
                 </p:childTnLst>
               </p:cTn>
               <p:prevCondLst>
@@ -7548,6 +6506,40 @@
           </a:prstGeom>
         </p:spPr>
       </p:pic>
+      <p:sp>
+        <p:nvSpPr>
+          <p:cNvPr id="3" name="Footer Placeholder 2">
+            <a:extLst>
+              <a:ext uri="{FF2B5EF4-FFF2-40B4-BE49-F238E27FC236}">
+                <a16:creationId xmlns:a16="http://schemas.microsoft.com/office/drawing/2014/main" id="{2CA8DAC6-BA86-4A60-8FCA-F4ECCACC215B}"/>
+              </a:ext>
+            </a:extLst>
+          </p:cNvPr>
+          <p:cNvSpPr>
+            <a:spLocks noGrp="1"/>
+          </p:cNvSpPr>
+          <p:nvPr>
+            <p:ph type="ftr" sz="quarter" idx="11"/>
+          </p:nvPr>
+        </p:nvSpPr>
+        <p:spPr>
+          <a:xfrm>
+            <a:off x="8602469" y="6536030"/>
+            <a:ext cx="4114800" cy="365125"/>
+          </a:xfrm>
+        </p:spPr>
+        <p:txBody>
+          <a:bodyPr/>
+          <a:lstStyle/>
+          <a:p>
+            <a:r>
+              <a:rPr lang="sv-SE" dirty="0"/>
+              <a:t>Courtesy of Jerry Wang, MATH 135, Fall 2021</a:t>
+            </a:r>
+            <a:endParaRPr lang="en-US" dirty="0"/>
+          </a:p>
+        </p:txBody>
+      </p:sp>
     </p:spTree>
     <p:extLst>
       <p:ext uri="{BB962C8B-B14F-4D97-AF65-F5344CB8AC3E}">
@@ -7558,906 +6550,6 @@
   <p:clrMapOvr>
     <a:masterClrMapping/>
   </p:clrMapOvr>
-</p:sld>
-</file>
-
-<file path=ppt/slides/slide9.xml><?xml version="1.0" encoding="utf-8"?>
-<p:sld xmlns:a="http://schemas.openxmlformats.org/drawingml/2006/main" xmlns:r="http://schemas.openxmlformats.org/officeDocument/2006/relationships" xmlns:p="http://schemas.openxmlformats.org/presentationml/2006/main">
-  <p:cSld>
-    <p:spTree>
-      <p:nvGrpSpPr>
-        <p:cNvPr id="1" name=""/>
-        <p:cNvGrpSpPr/>
-        <p:nvPr/>
-      </p:nvGrpSpPr>
-      <p:grpSpPr>
-        <a:xfrm>
-          <a:off x="0" y="0"/>
-          <a:ext cx="0" cy="0"/>
-          <a:chOff x="0" y="0"/>
-          <a:chExt cx="0" cy="0"/>
-        </a:xfrm>
-      </p:grpSpPr>
-      <p:sp>
-        <p:nvSpPr>
-          <p:cNvPr id="2" name="Title 1">
-            <a:extLst>
-              <a:ext uri="{FF2B5EF4-FFF2-40B4-BE49-F238E27FC236}">
-                <a16:creationId xmlns:a16="http://schemas.microsoft.com/office/drawing/2014/main" id="{3DFDFE6E-0F70-4498-A727-114AF49CE2A5}"/>
-              </a:ext>
-            </a:extLst>
-          </p:cNvPr>
-          <p:cNvSpPr>
-            <a:spLocks noGrp="1"/>
-          </p:cNvSpPr>
-          <p:nvPr>
-            <p:ph type="ctrTitle"/>
-          </p:nvPr>
-        </p:nvSpPr>
-        <p:spPr>
-          <a:xfrm>
-            <a:off x="366318" y="427839"/>
-            <a:ext cx="10472257" cy="3236053"/>
-          </a:xfrm>
-        </p:spPr>
-        <p:txBody>
-          <a:bodyPr>
-            <a:normAutofit/>
-          </a:bodyPr>
-          <a:lstStyle/>
-          <a:p>
-            <a:br>
-              <a:rPr lang="en-US" dirty="0"/>
-            </a:br>
-            <a:br>
-              <a:rPr lang="en-US" dirty="0"/>
-            </a:br>
-            <a:endParaRPr lang="en-US" dirty="0"/>
-          </a:p>
-        </p:txBody>
-      </p:sp>
-      <p:pic>
-        <p:nvPicPr>
-          <p:cNvPr id="3" name="Picture 2">
-            <a:extLst>
-              <a:ext uri="{FF2B5EF4-FFF2-40B4-BE49-F238E27FC236}">
-                <a16:creationId xmlns:a16="http://schemas.microsoft.com/office/drawing/2014/main" id="{4BE886BF-2F73-464C-839B-3CE78CD054FF}"/>
-              </a:ext>
-            </a:extLst>
-          </p:cNvPr>
-          <p:cNvPicPr>
-            <a:picLocks noChangeAspect="1"/>
-          </p:cNvPicPr>
-          <p:nvPr/>
-        </p:nvPicPr>
-        <p:blipFill>
-          <a:blip r:embed="rId2"/>
-          <a:stretch>
-            <a:fillRect/>
-          </a:stretch>
-        </p:blipFill>
-        <p:spPr>
-          <a:xfrm>
-            <a:off x="3048353" y="-241067"/>
-            <a:ext cx="6334985" cy="1089456"/>
-          </a:xfrm>
-          <a:prstGeom prst="rect">
-            <a:avLst/>
-          </a:prstGeom>
-        </p:spPr>
-      </p:pic>
-      <p:sp>
-        <p:nvSpPr>
-          <p:cNvPr id="8" name="TextBox 7">
-            <a:extLst>
-              <a:ext uri="{FF2B5EF4-FFF2-40B4-BE49-F238E27FC236}">
-                <a16:creationId xmlns:a16="http://schemas.microsoft.com/office/drawing/2014/main" id="{53B09C95-0B4A-4BCD-88A9-77079655ADE2}"/>
-              </a:ext>
-            </a:extLst>
-          </p:cNvPr>
-          <p:cNvSpPr txBox="1"/>
-          <p:nvPr/>
-        </p:nvSpPr>
-        <p:spPr>
-          <a:xfrm>
-            <a:off x="239697" y="771089"/>
-            <a:ext cx="11952303" cy="6724918"/>
-          </a:xfrm>
-          <a:prstGeom prst="rect">
-            <a:avLst/>
-          </a:prstGeom>
-          <a:noFill/>
-        </p:spPr>
-        <p:txBody>
-          <a:bodyPr wrap="square" rtlCol="0">
-            <a:spAutoFit/>
-          </a:bodyPr>
-          <a:lstStyle/>
-          <a:p>
-            <a:r>
-              <a:rPr lang="en-US" sz="2400" dirty="0"/>
-              <a:t>¬(∃ </a:t>
-            </a:r>
-            <a:r>
-              <a:rPr lang="en-US" sz="2400" dirty="0" err="1"/>
-              <a:t>p,q</a:t>
-            </a:r>
-            <a:r>
-              <a:rPr lang="en-US" sz="2400" dirty="0"/>
-              <a:t> </a:t>
-            </a:r>
-            <a:r>
-              <a:rPr lang="el-GR" sz="2400" dirty="0"/>
-              <a:t>ϵ</a:t>
-            </a:r>
-            <a:r>
-              <a:rPr lang="en-US" sz="2400" dirty="0"/>
-              <a:t> ℤ   </a:t>
-            </a:r>
-            <a:r>
-              <a:rPr lang="en-US" sz="2400" dirty="0" err="1"/>
-              <a:t>s.t.</a:t>
-            </a:r>
-            <a:r>
-              <a:rPr lang="en-US" sz="2400" dirty="0"/>
-              <a:t>  sqrt(3) = p/q) </a:t>
-            </a:r>
-          </a:p>
-          <a:p>
-            <a:endParaRPr lang="en-US" sz="500" dirty="0"/>
-          </a:p>
-          <a:p>
-            <a:r>
-              <a:rPr lang="en-US" sz="2400" dirty="0"/>
-              <a:t>Do we have to worry about q=0?</a:t>
-            </a:r>
-          </a:p>
-          <a:p>
-            <a:endParaRPr lang="en-US" sz="1100" dirty="0"/>
-          </a:p>
-          <a:p>
-            <a:r>
-              <a:rPr lang="en-US" sz="2400" dirty="0"/>
-              <a:t>Answer: We’re only saying that </a:t>
-            </a:r>
-            <a:r>
-              <a:rPr lang="en-US" sz="2400" b="1" i="1" dirty="0"/>
-              <a:t>there exists</a:t>
-            </a:r>
-            <a:r>
-              <a:rPr lang="en-US" sz="2400" dirty="0"/>
-              <a:t> a q such that sqrt(3) = p/q, </a:t>
-            </a:r>
-          </a:p>
-          <a:p>
-            <a:r>
-              <a:rPr lang="en-US" sz="2400" dirty="0"/>
-              <a:t>                not that p/q must make sense for all q.</a:t>
-            </a:r>
-          </a:p>
-          <a:p>
-            <a:endParaRPr lang="en-US" sz="2400" dirty="0"/>
-          </a:p>
-          <a:p>
-            <a:r>
-              <a:rPr lang="en-US" sz="2400" dirty="0"/>
-              <a:t>Outline of Proof:</a:t>
-            </a:r>
-          </a:p>
-          <a:p>
-            <a:endParaRPr lang="en-US" sz="2400" dirty="0"/>
-          </a:p>
-          <a:p>
-            <a:r>
-              <a:rPr lang="en-US" sz="2400" dirty="0"/>
-              <a:t>Assume:  ∃ </a:t>
-            </a:r>
-            <a:r>
-              <a:rPr lang="en-US" sz="2400" dirty="0" err="1"/>
-              <a:t>p,q</a:t>
-            </a:r>
-            <a:r>
-              <a:rPr lang="en-US" sz="2400" dirty="0"/>
-              <a:t> </a:t>
-            </a:r>
-            <a:r>
-              <a:rPr lang="el-GR" sz="2400" dirty="0"/>
-              <a:t>ϵ</a:t>
-            </a:r>
-            <a:r>
-              <a:rPr lang="en-US" sz="2400" dirty="0"/>
-              <a:t> ℤ   </a:t>
-            </a:r>
-            <a:r>
-              <a:rPr lang="en-US" sz="2400" dirty="0" err="1"/>
-              <a:t>s.t.</a:t>
-            </a:r>
-            <a:r>
-              <a:rPr lang="en-US" sz="2400" dirty="0"/>
-              <a:t>  sqrt(3) = p/q</a:t>
-            </a:r>
-          </a:p>
-          <a:p>
-            <a:endParaRPr lang="en-US" sz="2400" dirty="0"/>
-          </a:p>
-          <a:p>
-            <a:r>
-              <a:rPr lang="en-US" sz="2400" dirty="0"/>
-              <a:t>Square both sides: 3q</a:t>
-            </a:r>
-            <a:r>
-              <a:rPr lang="en-US" sz="2400" baseline="30000" dirty="0"/>
-              <a:t>2 </a:t>
-            </a:r>
-            <a:r>
-              <a:rPr lang="en-US" sz="2400" dirty="0"/>
-              <a:t>= p</a:t>
-            </a:r>
-            <a:r>
-              <a:rPr lang="en-US" sz="2400" baseline="30000" dirty="0"/>
-              <a:t>2</a:t>
-            </a:r>
-          </a:p>
-          <a:p>
-            <a:endParaRPr lang="en-US" sz="2400" baseline="30000" dirty="0"/>
-          </a:p>
-          <a:p>
-            <a:r>
-              <a:rPr lang="en-US" sz="2400" u="sng" dirty="0"/>
-              <a:t>Case 1:</a:t>
-            </a:r>
-            <a:r>
-              <a:rPr lang="en-US" sz="2400" dirty="0"/>
-              <a:t> q is even.</a:t>
-            </a:r>
-          </a:p>
-          <a:p>
-            <a:r>
-              <a:rPr lang="en-US" sz="2400" dirty="0"/>
-              <a:t>     =&gt; 3q</a:t>
-            </a:r>
-            <a:r>
-              <a:rPr lang="en-US" sz="2400" baseline="30000" dirty="0"/>
-              <a:t>2 </a:t>
-            </a:r>
-            <a:r>
-              <a:rPr lang="en-US" sz="2400" dirty="0"/>
-              <a:t>is even (whatever factor of 2 is in q, is still going to be a factor of 3q</a:t>
-            </a:r>
-            <a:r>
-              <a:rPr lang="en-US" sz="2400" baseline="30000" dirty="0"/>
-              <a:t>2</a:t>
-            </a:r>
-            <a:r>
-              <a:rPr lang="en-US" sz="2400" dirty="0"/>
-              <a:t>)</a:t>
-            </a:r>
-          </a:p>
-          <a:p>
-            <a:r>
-              <a:rPr lang="en-US" sz="2400" dirty="0"/>
-              <a:t>     =&gt; p</a:t>
-            </a:r>
-            <a:r>
-              <a:rPr lang="en-US" sz="2400" baseline="30000" dirty="0"/>
-              <a:t>2</a:t>
-            </a:r>
-            <a:r>
-              <a:rPr lang="en-US" sz="2400" dirty="0"/>
-              <a:t> is even, and p is even</a:t>
-            </a:r>
-          </a:p>
-          <a:p>
-            <a:r>
-              <a:rPr lang="en-US" sz="2400" dirty="0"/>
-              <a:t>     =&gt; p/q is an integer (since p and q are even). [</a:t>
-            </a:r>
-            <a:r>
-              <a:rPr lang="en-US" sz="2400" dirty="0">
-                <a:solidFill>
-                  <a:srgbClr val="FF0000"/>
-                </a:solidFill>
-              </a:rPr>
-              <a:t>Prove that sqrt(3) is not an integer: Exercise</a:t>
-            </a:r>
-            <a:r>
-              <a:rPr lang="en-US" sz="2400" dirty="0"/>
-              <a:t>].</a:t>
-            </a:r>
-          </a:p>
-          <a:p>
-            <a:endParaRPr lang="en-US" sz="2400" dirty="0"/>
-          </a:p>
-          <a:p>
-            <a:endParaRPr lang="en-US" sz="700" dirty="0"/>
-          </a:p>
-          <a:p>
-            <a:endParaRPr lang="en-US" sz="800" dirty="0"/>
-          </a:p>
-          <a:p>
-            <a:endParaRPr lang="en-US" sz="2400" dirty="0"/>
-          </a:p>
-        </p:txBody>
-      </p:sp>
-    </p:spTree>
-    <p:extLst>
-      <p:ext uri="{BB962C8B-B14F-4D97-AF65-F5344CB8AC3E}">
-        <p14:creationId xmlns:p14="http://schemas.microsoft.com/office/powerpoint/2010/main" val="1173767071"/>
-      </p:ext>
-    </p:extLst>
-  </p:cSld>
-  <p:clrMapOvr>
-    <a:masterClrMapping/>
-  </p:clrMapOvr>
-  <p:timing>
-    <p:tnLst>
-      <p:par>
-        <p:cTn id="1" dur="indefinite" restart="never" nodeType="tmRoot">
-          <p:childTnLst>
-            <p:seq concurrent="1" nextAc="seek">
-              <p:cTn id="2" dur="indefinite" nodeType="mainSeq">
-                <p:childTnLst>
-                  <p:par>
-                    <p:cTn id="3" fill="hold">
-                      <p:stCondLst>
-                        <p:cond delay="indefinite"/>
-                      </p:stCondLst>
-                      <p:childTnLst>
-                        <p:par>
-                          <p:cTn id="4" fill="hold">
-                            <p:stCondLst>
-                              <p:cond delay="0"/>
-                            </p:stCondLst>
-                            <p:childTnLst>
-                              <p:par>
-                                <p:cTn id="5" presetID="1" presetClass="entr" presetSubtype="0" fill="hold" nodeType="clickEffect">
-                                  <p:stCondLst>
-                                    <p:cond delay="0"/>
-                                  </p:stCondLst>
-                                  <p:childTnLst>
-                                    <p:set>
-                                      <p:cBhvr>
-                                        <p:cTn id="6" dur="1" fill="hold">
-                                          <p:stCondLst>
-                                            <p:cond delay="0"/>
-                                          </p:stCondLst>
-                                        </p:cTn>
-                                        <p:tgtEl>
-                                          <p:spTgt spid="8">
-                                            <p:txEl>
-                                              <p:pRg st="0" end="0"/>
-                                            </p:txEl>
-                                          </p:spTgt>
-                                        </p:tgtEl>
-                                        <p:attrNameLst>
-                                          <p:attrName>style.visibility</p:attrName>
-                                        </p:attrNameLst>
-                                      </p:cBhvr>
-                                      <p:to>
-                                        <p:strVal val="visible"/>
-                                      </p:to>
-                                    </p:set>
-                                  </p:childTnLst>
-                                </p:cTn>
-                              </p:par>
-                            </p:childTnLst>
-                          </p:cTn>
-                        </p:par>
-                      </p:childTnLst>
-                    </p:cTn>
-                  </p:par>
-                  <p:par>
-                    <p:cTn id="7" fill="hold">
-                      <p:stCondLst>
-                        <p:cond delay="indefinite"/>
-                      </p:stCondLst>
-                      <p:childTnLst>
-                        <p:par>
-                          <p:cTn id="8" fill="hold">
-                            <p:stCondLst>
-                              <p:cond delay="0"/>
-                            </p:stCondLst>
-                            <p:childTnLst>
-                              <p:par>
-                                <p:cTn id="9" presetID="1" presetClass="entr" presetSubtype="0" fill="hold" nodeType="clickEffect">
-                                  <p:stCondLst>
-                                    <p:cond delay="0"/>
-                                  </p:stCondLst>
-                                  <p:childTnLst>
-                                    <p:set>
-                                      <p:cBhvr>
-                                        <p:cTn id="10" dur="1" fill="hold">
-                                          <p:stCondLst>
-                                            <p:cond delay="0"/>
-                                          </p:stCondLst>
-                                        </p:cTn>
-                                        <p:tgtEl>
-                                          <p:spTgt spid="8">
-                                            <p:txEl>
-                                              <p:pRg st="2" end="2"/>
-                                            </p:txEl>
-                                          </p:spTgt>
-                                        </p:tgtEl>
-                                        <p:attrNameLst>
-                                          <p:attrName>style.visibility</p:attrName>
-                                        </p:attrNameLst>
-                                      </p:cBhvr>
-                                      <p:to>
-                                        <p:strVal val="visible"/>
-                                      </p:to>
-                                    </p:set>
-                                  </p:childTnLst>
-                                </p:cTn>
-                              </p:par>
-                            </p:childTnLst>
-                          </p:cTn>
-                        </p:par>
-                      </p:childTnLst>
-                    </p:cTn>
-                  </p:par>
-                  <p:par>
-                    <p:cTn id="11" fill="hold">
-                      <p:stCondLst>
-                        <p:cond delay="indefinite"/>
-                      </p:stCondLst>
-                      <p:childTnLst>
-                        <p:par>
-                          <p:cTn id="12" fill="hold">
-                            <p:stCondLst>
-                              <p:cond delay="0"/>
-                            </p:stCondLst>
-                            <p:childTnLst>
-                              <p:par>
-                                <p:cTn id="13" presetID="1" presetClass="entr" presetSubtype="0" fill="hold" nodeType="clickEffect">
-                                  <p:stCondLst>
-                                    <p:cond delay="0"/>
-                                  </p:stCondLst>
-                                  <p:childTnLst>
-                                    <p:set>
-                                      <p:cBhvr>
-                                        <p:cTn id="14" dur="1" fill="hold">
-                                          <p:stCondLst>
-                                            <p:cond delay="0"/>
-                                          </p:stCondLst>
-                                        </p:cTn>
-                                        <p:tgtEl>
-                                          <p:spTgt spid="8">
-                                            <p:txEl>
-                                              <p:pRg st="4" end="4"/>
-                                            </p:txEl>
-                                          </p:spTgt>
-                                        </p:tgtEl>
-                                        <p:attrNameLst>
-                                          <p:attrName>style.visibility</p:attrName>
-                                        </p:attrNameLst>
-                                      </p:cBhvr>
-                                      <p:to>
-                                        <p:strVal val="visible"/>
-                                      </p:to>
-                                    </p:set>
-                                  </p:childTnLst>
-                                </p:cTn>
-                              </p:par>
-                            </p:childTnLst>
-                          </p:cTn>
-                        </p:par>
-                      </p:childTnLst>
-                    </p:cTn>
-                  </p:par>
-                  <p:par>
-                    <p:cTn id="15" fill="hold">
-                      <p:stCondLst>
-                        <p:cond delay="indefinite"/>
-                      </p:stCondLst>
-                      <p:childTnLst>
-                        <p:par>
-                          <p:cTn id="16" fill="hold">
-                            <p:stCondLst>
-                              <p:cond delay="0"/>
-                            </p:stCondLst>
-                            <p:childTnLst>
-                              <p:par>
-                                <p:cTn id="17" presetID="1" presetClass="entr" presetSubtype="0" fill="hold" nodeType="clickEffect">
-                                  <p:stCondLst>
-                                    <p:cond delay="0"/>
-                                  </p:stCondLst>
-                                  <p:childTnLst>
-                                    <p:set>
-                                      <p:cBhvr>
-                                        <p:cTn id="18" dur="1" fill="hold">
-                                          <p:stCondLst>
-                                            <p:cond delay="0"/>
-                                          </p:stCondLst>
-                                        </p:cTn>
-                                        <p:tgtEl>
-                                          <p:spTgt spid="8">
-                                            <p:txEl>
-                                              <p:pRg st="5" end="5"/>
-                                            </p:txEl>
-                                          </p:spTgt>
-                                        </p:tgtEl>
-                                        <p:attrNameLst>
-                                          <p:attrName>style.visibility</p:attrName>
-                                        </p:attrNameLst>
-                                      </p:cBhvr>
-                                      <p:to>
-                                        <p:strVal val="visible"/>
-                                      </p:to>
-                                    </p:set>
-                                  </p:childTnLst>
-                                </p:cTn>
-                              </p:par>
-                            </p:childTnLst>
-                          </p:cTn>
-                        </p:par>
-                      </p:childTnLst>
-                    </p:cTn>
-                  </p:par>
-                  <p:par>
-                    <p:cTn id="19" fill="hold">
-                      <p:stCondLst>
-                        <p:cond delay="indefinite"/>
-                      </p:stCondLst>
-                      <p:childTnLst>
-                        <p:par>
-                          <p:cTn id="20" fill="hold">
-                            <p:stCondLst>
-                              <p:cond delay="0"/>
-                            </p:stCondLst>
-                            <p:childTnLst>
-                              <p:par>
-                                <p:cTn id="21" presetID="1" presetClass="entr" presetSubtype="0" fill="hold" nodeType="clickEffect">
-                                  <p:stCondLst>
-                                    <p:cond delay="0"/>
-                                  </p:stCondLst>
-                                  <p:childTnLst>
-                                    <p:set>
-                                      <p:cBhvr>
-                                        <p:cTn id="22" dur="1" fill="hold">
-                                          <p:stCondLst>
-                                            <p:cond delay="0"/>
-                                          </p:stCondLst>
-                                        </p:cTn>
-                                        <p:tgtEl>
-                                          <p:spTgt spid="8">
-                                            <p:txEl>
-                                              <p:pRg st="7" end="7"/>
-                                            </p:txEl>
-                                          </p:spTgt>
-                                        </p:tgtEl>
-                                        <p:attrNameLst>
-                                          <p:attrName>style.visibility</p:attrName>
-                                        </p:attrNameLst>
-                                      </p:cBhvr>
-                                      <p:to>
-                                        <p:strVal val="visible"/>
-                                      </p:to>
-                                    </p:set>
-                                  </p:childTnLst>
-                                </p:cTn>
-                              </p:par>
-                            </p:childTnLst>
-                          </p:cTn>
-                        </p:par>
-                      </p:childTnLst>
-                    </p:cTn>
-                  </p:par>
-                  <p:par>
-                    <p:cTn id="23" fill="hold">
-                      <p:stCondLst>
-                        <p:cond delay="indefinite"/>
-                      </p:stCondLst>
-                      <p:childTnLst>
-                        <p:par>
-                          <p:cTn id="24" fill="hold">
-                            <p:stCondLst>
-                              <p:cond delay="0"/>
-                            </p:stCondLst>
-                            <p:childTnLst>
-                              <p:par>
-                                <p:cTn id="25" presetID="1" presetClass="entr" presetSubtype="0" fill="hold" nodeType="clickEffect">
-                                  <p:stCondLst>
-                                    <p:cond delay="0"/>
-                                  </p:stCondLst>
-                                  <p:childTnLst>
-                                    <p:set>
-                                      <p:cBhvr>
-                                        <p:cTn id="26" dur="1" fill="hold">
-                                          <p:stCondLst>
-                                            <p:cond delay="0"/>
-                                          </p:stCondLst>
-                                        </p:cTn>
-                                        <p:tgtEl>
-                                          <p:spTgt spid="8">
-                                            <p:txEl>
-                                              <p:pRg st="9" end="9"/>
-                                            </p:txEl>
-                                          </p:spTgt>
-                                        </p:tgtEl>
-                                        <p:attrNameLst>
-                                          <p:attrName>style.visibility</p:attrName>
-                                        </p:attrNameLst>
-                                      </p:cBhvr>
-                                      <p:to>
-                                        <p:strVal val="visible"/>
-                                      </p:to>
-                                    </p:set>
-                                  </p:childTnLst>
-                                </p:cTn>
-                              </p:par>
-                            </p:childTnLst>
-                          </p:cTn>
-                        </p:par>
-                      </p:childTnLst>
-                    </p:cTn>
-                  </p:par>
-                  <p:par>
-                    <p:cTn id="27" fill="hold">
-                      <p:stCondLst>
-                        <p:cond delay="indefinite"/>
-                      </p:stCondLst>
-                      <p:childTnLst>
-                        <p:par>
-                          <p:cTn id="28" fill="hold">
-                            <p:stCondLst>
-                              <p:cond delay="0"/>
-                            </p:stCondLst>
-                            <p:childTnLst>
-                              <p:par>
-                                <p:cTn id="29" presetID="1" presetClass="entr" presetSubtype="0" fill="hold" nodeType="clickEffect">
-                                  <p:stCondLst>
-                                    <p:cond delay="0"/>
-                                  </p:stCondLst>
-                                  <p:childTnLst>
-                                    <p:set>
-                                      <p:cBhvr>
-                                        <p:cTn id="30" dur="1" fill="hold">
-                                          <p:stCondLst>
-                                            <p:cond delay="0"/>
-                                          </p:stCondLst>
-                                        </p:cTn>
-                                        <p:tgtEl>
-                                          <p:spTgt spid="8">
-                                            <p:txEl>
-                                              <p:pRg st="11" end="11"/>
-                                            </p:txEl>
-                                          </p:spTgt>
-                                        </p:tgtEl>
-                                        <p:attrNameLst>
-                                          <p:attrName>style.visibility</p:attrName>
-                                        </p:attrNameLst>
-                                      </p:cBhvr>
-                                      <p:to>
-                                        <p:strVal val="visible"/>
-                                      </p:to>
-                                    </p:set>
-                                  </p:childTnLst>
-                                </p:cTn>
-                              </p:par>
-                            </p:childTnLst>
-                          </p:cTn>
-                        </p:par>
-                      </p:childTnLst>
-                    </p:cTn>
-                  </p:par>
-                  <p:par>
-                    <p:cTn id="31" fill="hold">
-                      <p:stCondLst>
-                        <p:cond delay="indefinite"/>
-                      </p:stCondLst>
-                      <p:childTnLst>
-                        <p:par>
-                          <p:cTn id="32" fill="hold">
-                            <p:stCondLst>
-                              <p:cond delay="0"/>
-                            </p:stCondLst>
-                            <p:childTnLst>
-                              <p:par>
-                                <p:cTn id="33" presetID="1" presetClass="entr" presetSubtype="0" fill="hold" nodeType="clickEffect">
-                                  <p:stCondLst>
-                                    <p:cond delay="0"/>
-                                  </p:stCondLst>
-                                  <p:childTnLst>
-                                    <p:set>
-                                      <p:cBhvr>
-                                        <p:cTn id="34" dur="1" fill="hold">
-                                          <p:stCondLst>
-                                            <p:cond delay="0"/>
-                                          </p:stCondLst>
-                                        </p:cTn>
-                                        <p:tgtEl>
-                                          <p:spTgt spid="8">
-                                            <p:txEl>
-                                              <p:pRg st="13" end="13"/>
-                                            </p:txEl>
-                                          </p:spTgt>
-                                        </p:tgtEl>
-                                        <p:attrNameLst>
-                                          <p:attrName>style.visibility</p:attrName>
-                                        </p:attrNameLst>
-                                      </p:cBhvr>
-                                      <p:to>
-                                        <p:strVal val="visible"/>
-                                      </p:to>
-                                    </p:set>
-                                  </p:childTnLst>
-                                </p:cTn>
-                              </p:par>
-                            </p:childTnLst>
-                          </p:cTn>
-                        </p:par>
-                      </p:childTnLst>
-                    </p:cTn>
-                  </p:par>
-                  <p:par>
-                    <p:cTn id="35" fill="hold">
-                      <p:stCondLst>
-                        <p:cond delay="indefinite"/>
-                      </p:stCondLst>
-                      <p:childTnLst>
-                        <p:par>
-                          <p:cTn id="36" fill="hold">
-                            <p:stCondLst>
-                              <p:cond delay="0"/>
-                            </p:stCondLst>
-                            <p:childTnLst>
-                              <p:par>
-                                <p:cTn id="37" presetID="1" presetClass="entr" presetSubtype="0" fill="hold" nodeType="clickEffect">
-                                  <p:stCondLst>
-                                    <p:cond delay="0"/>
-                                  </p:stCondLst>
-                                  <p:childTnLst>
-                                    <p:set>
-                                      <p:cBhvr>
-                                        <p:cTn id="38" dur="1" fill="hold">
-                                          <p:stCondLst>
-                                            <p:cond delay="0"/>
-                                          </p:stCondLst>
-                                        </p:cTn>
-                                        <p:tgtEl>
-                                          <p:spTgt spid="8">
-                                            <p:txEl>
-                                              <p:pRg st="14" end="14"/>
-                                            </p:txEl>
-                                          </p:spTgt>
-                                        </p:tgtEl>
-                                        <p:attrNameLst>
-                                          <p:attrName>style.visibility</p:attrName>
-                                        </p:attrNameLst>
-                                      </p:cBhvr>
-                                      <p:to>
-                                        <p:strVal val="visible"/>
-                                      </p:to>
-                                    </p:set>
-                                  </p:childTnLst>
-                                </p:cTn>
-                              </p:par>
-                            </p:childTnLst>
-                          </p:cTn>
-                        </p:par>
-                      </p:childTnLst>
-                    </p:cTn>
-                  </p:par>
-                  <p:par>
-                    <p:cTn id="39" fill="hold">
-                      <p:stCondLst>
-                        <p:cond delay="indefinite"/>
-                      </p:stCondLst>
-                      <p:childTnLst>
-                        <p:par>
-                          <p:cTn id="40" fill="hold">
-                            <p:stCondLst>
-                              <p:cond delay="0"/>
-                            </p:stCondLst>
-                            <p:childTnLst>
-                              <p:par>
-                                <p:cTn id="41" presetID="1" presetClass="entr" presetSubtype="0" fill="hold" nodeType="clickEffect">
-                                  <p:stCondLst>
-                                    <p:cond delay="0"/>
-                                  </p:stCondLst>
-                                  <p:childTnLst>
-                                    <p:set>
-                                      <p:cBhvr>
-                                        <p:cTn id="42" dur="1" fill="hold">
-                                          <p:stCondLst>
-                                            <p:cond delay="0"/>
-                                          </p:stCondLst>
-                                        </p:cTn>
-                                        <p:tgtEl>
-                                          <p:spTgt spid="8">
-                                            <p:txEl>
-                                              <p:pRg st="15" end="15"/>
-                                            </p:txEl>
-                                          </p:spTgt>
-                                        </p:tgtEl>
-                                        <p:attrNameLst>
-                                          <p:attrName>style.visibility</p:attrName>
-                                        </p:attrNameLst>
-                                      </p:cBhvr>
-                                      <p:to>
-                                        <p:strVal val="visible"/>
-                                      </p:to>
-                                    </p:set>
-                                  </p:childTnLst>
-                                </p:cTn>
-                              </p:par>
-                            </p:childTnLst>
-                          </p:cTn>
-                        </p:par>
-                      </p:childTnLst>
-                    </p:cTn>
-                  </p:par>
-                  <p:par>
-                    <p:cTn id="43" fill="hold">
-                      <p:stCondLst>
-                        <p:cond delay="indefinite"/>
-                      </p:stCondLst>
-                      <p:childTnLst>
-                        <p:par>
-                          <p:cTn id="44" fill="hold">
-                            <p:stCondLst>
-                              <p:cond delay="0"/>
-                            </p:stCondLst>
-                            <p:childTnLst>
-                              <p:par>
-                                <p:cTn id="45" presetID="1" presetClass="entr" presetSubtype="0" fill="hold" nodeType="clickEffect">
-                                  <p:stCondLst>
-                                    <p:cond delay="0"/>
-                                  </p:stCondLst>
-                                  <p:childTnLst>
-                                    <p:set>
-                                      <p:cBhvr>
-                                        <p:cTn id="46" dur="1" fill="hold">
-                                          <p:stCondLst>
-                                            <p:cond delay="0"/>
-                                          </p:stCondLst>
-                                        </p:cTn>
-                                        <p:tgtEl>
-                                          <p:spTgt spid="8">
-                                            <p:txEl>
-                                              <p:pRg st="16" end="16"/>
-                                            </p:txEl>
-                                          </p:spTgt>
-                                        </p:tgtEl>
-                                        <p:attrNameLst>
-                                          <p:attrName>style.visibility</p:attrName>
-                                        </p:attrNameLst>
-                                      </p:cBhvr>
-                                      <p:to>
-                                        <p:strVal val="visible"/>
-                                      </p:to>
-                                    </p:set>
-                                  </p:childTnLst>
-                                </p:cTn>
-                              </p:par>
-                            </p:childTnLst>
-                          </p:cTn>
-                        </p:par>
-                      </p:childTnLst>
-                    </p:cTn>
-                  </p:par>
-                </p:childTnLst>
-              </p:cTn>
-              <p:prevCondLst>
-                <p:cond evt="onPrev" delay="0">
-                  <p:tgtEl>
-                    <p:sldTgt/>
-                  </p:tgtEl>
-                </p:cond>
-              </p:prevCondLst>
-              <p:nextCondLst>
-                <p:cond evt="onNext" delay="0">
-                  <p:tgtEl>
-                    <p:sldTgt/>
-                  </p:tgtEl>
-                </p:cond>
-              </p:nextCondLst>
-            </p:seq>
-          </p:childTnLst>
-        </p:cTn>
-      </p:par>
-    </p:tnLst>
-  </p:timing>
 </p:sld>
 </file>
 
@@ -8754,4 +6846,299 @@
     </a:ext>
   </a:extLst>
 </a:theme>
+</file>
+
+<file path=ppt/theme/theme2.xml><?xml version="1.0" encoding="utf-8"?>
+<a:theme xmlns:a="http://schemas.openxmlformats.org/drawingml/2006/main" name="Office Theme">
+  <a:themeElements>
+    <a:clrScheme name="Office">
+      <a:dk1>
+        <a:sysClr val="windowText" lastClr="000000"/>
+      </a:dk1>
+      <a:lt1>
+        <a:sysClr val="window" lastClr="FFFFFF"/>
+      </a:lt1>
+      <a:dk2>
+        <a:srgbClr val="44546A"/>
+      </a:dk2>
+      <a:lt2>
+        <a:srgbClr val="E7E6E6"/>
+      </a:lt2>
+      <a:accent1>
+        <a:srgbClr val="4472C4"/>
+      </a:accent1>
+      <a:accent2>
+        <a:srgbClr val="ED7D31"/>
+      </a:accent2>
+      <a:accent3>
+        <a:srgbClr val="A5A5A5"/>
+      </a:accent3>
+      <a:accent4>
+        <a:srgbClr val="FFC000"/>
+      </a:accent4>
+      <a:accent5>
+        <a:srgbClr val="5B9BD5"/>
+      </a:accent5>
+      <a:accent6>
+        <a:srgbClr val="70AD47"/>
+      </a:accent6>
+      <a:hlink>
+        <a:srgbClr val="0563C1"/>
+      </a:hlink>
+      <a:folHlink>
+        <a:srgbClr val="954F72"/>
+      </a:folHlink>
+    </a:clrScheme>
+    <a:fontScheme name="Office">
+      <a:majorFont>
+        <a:latin typeface="Calibri Light" panose="020F0302020204030204"/>
+        <a:ea typeface=""/>
+        <a:cs typeface=""/>
+        <a:font script="Jpan" typeface="游ゴシック Light"/>
+        <a:font script="Hang" typeface="맑은 고딕"/>
+        <a:font script="Hans" typeface="等线 Light"/>
+        <a:font script="Hant" typeface="新細明體"/>
+        <a:font script="Arab" typeface="Times New Roman"/>
+        <a:font script="Hebr" typeface="Times New Roman"/>
+        <a:font script="Thai" typeface="Angsana New"/>
+        <a:font script="Ethi" typeface="Nyala"/>
+        <a:font script="Beng" typeface="Vrinda"/>
+        <a:font script="Gujr" typeface="Shruti"/>
+        <a:font script="Khmr" typeface="MoolBoran"/>
+        <a:font script="Knda" typeface="Tunga"/>
+        <a:font script="Guru" typeface="Raavi"/>
+        <a:font script="Cans" typeface="Euphemia"/>
+        <a:font script="Cher" typeface="Plantagenet Cherokee"/>
+        <a:font script="Yiii" typeface="Microsoft Yi Baiti"/>
+        <a:font script="Tibt" typeface="Microsoft Himalaya"/>
+        <a:font script="Thaa" typeface="MV Boli"/>
+        <a:font script="Deva" typeface="Mangal"/>
+        <a:font script="Telu" typeface="Gautami"/>
+        <a:font script="Taml" typeface="Latha"/>
+        <a:font script="Syrc" typeface="Estrangelo Edessa"/>
+        <a:font script="Orya" typeface="Kalinga"/>
+        <a:font script="Mlym" typeface="Kartika"/>
+        <a:font script="Laoo" typeface="DokChampa"/>
+        <a:font script="Sinh" typeface="Iskoola Pota"/>
+        <a:font script="Mong" typeface="Mongolian Baiti"/>
+        <a:font script="Viet" typeface="Times New Roman"/>
+        <a:font script="Uigh" typeface="Microsoft Uighur"/>
+        <a:font script="Geor" typeface="Sylfaen"/>
+        <a:font script="Armn" typeface="Arial"/>
+        <a:font script="Bugi" typeface="Leelawadee UI"/>
+        <a:font script="Bopo" typeface="Microsoft JhengHei"/>
+        <a:font script="Java" typeface="Javanese Text"/>
+        <a:font script="Lisu" typeface="Segoe UI"/>
+        <a:font script="Mymr" typeface="Myanmar Text"/>
+        <a:font script="Nkoo" typeface="Ebrima"/>
+        <a:font script="Olck" typeface="Nirmala UI"/>
+        <a:font script="Osma" typeface="Ebrima"/>
+        <a:font script="Phag" typeface="Phagspa"/>
+        <a:font script="Syrn" typeface="Estrangelo Edessa"/>
+        <a:font script="Syrj" typeface="Estrangelo Edessa"/>
+        <a:font script="Syre" typeface="Estrangelo Edessa"/>
+        <a:font script="Sora" typeface="Nirmala UI"/>
+        <a:font script="Tale" typeface="Microsoft Tai Le"/>
+        <a:font script="Talu" typeface="Microsoft New Tai Lue"/>
+        <a:font script="Tfng" typeface="Ebrima"/>
+      </a:majorFont>
+      <a:minorFont>
+        <a:latin typeface="Calibri" panose="020F0502020204030204"/>
+        <a:ea typeface=""/>
+        <a:cs typeface=""/>
+        <a:font script="Jpan" typeface="游ゴシック"/>
+        <a:font script="Hang" typeface="맑은 고딕"/>
+        <a:font script="Hans" typeface="等线"/>
+        <a:font script="Hant" typeface="新細明體"/>
+        <a:font script="Arab" typeface="Arial"/>
+        <a:font script="Hebr" typeface="Arial"/>
+        <a:font script="Thai" typeface="Cordia New"/>
+        <a:font script="Ethi" typeface="Nyala"/>
+        <a:font script="Beng" typeface="Vrinda"/>
+        <a:font script="Gujr" typeface="Shruti"/>
+        <a:font script="Khmr" typeface="DaunPenh"/>
+        <a:font script="Knda" typeface="Tunga"/>
+        <a:font script="Guru" typeface="Raavi"/>
+        <a:font script="Cans" typeface="Euphemia"/>
+        <a:font script="Cher" typeface="Plantagenet Cherokee"/>
+        <a:font script="Yiii" typeface="Microsoft Yi Baiti"/>
+        <a:font script="Tibt" typeface="Microsoft Himalaya"/>
+        <a:font script="Thaa" typeface="MV Boli"/>
+        <a:font script="Deva" typeface="Mangal"/>
+        <a:font script="Telu" typeface="Gautami"/>
+        <a:font script="Taml" typeface="Latha"/>
+        <a:font script="Syrc" typeface="Estrangelo Edessa"/>
+        <a:font script="Orya" typeface="Kalinga"/>
+        <a:font script="Mlym" typeface="Kartika"/>
+        <a:font script="Laoo" typeface="DokChampa"/>
+        <a:font script="Sinh" typeface="Iskoola Pota"/>
+        <a:font script="Mong" typeface="Mongolian Baiti"/>
+        <a:font script="Viet" typeface="Arial"/>
+        <a:font script="Uigh" typeface="Microsoft Uighur"/>
+        <a:font script="Geor" typeface="Sylfaen"/>
+        <a:font script="Armn" typeface="Arial"/>
+        <a:font script="Bugi" typeface="Leelawadee UI"/>
+        <a:font script="Bopo" typeface="Microsoft JhengHei"/>
+        <a:font script="Java" typeface="Javanese Text"/>
+        <a:font script="Lisu" typeface="Segoe UI"/>
+        <a:font script="Mymr" typeface="Myanmar Text"/>
+        <a:font script="Nkoo" typeface="Ebrima"/>
+        <a:font script="Olck" typeface="Nirmala UI"/>
+        <a:font script="Osma" typeface="Ebrima"/>
+        <a:font script="Phag" typeface="Phagspa"/>
+        <a:font script="Syrn" typeface="Estrangelo Edessa"/>
+        <a:font script="Syrj" typeface="Estrangelo Edessa"/>
+        <a:font script="Syre" typeface="Estrangelo Edessa"/>
+        <a:font script="Sora" typeface="Nirmala UI"/>
+        <a:font script="Tale" typeface="Microsoft Tai Le"/>
+        <a:font script="Talu" typeface="Microsoft New Tai Lue"/>
+        <a:font script="Tfng" typeface="Ebrima"/>
+      </a:minorFont>
+    </a:fontScheme>
+    <a:fmtScheme name="Office">
+      <a:fillStyleLst>
+        <a:solidFill>
+          <a:schemeClr val="phClr"/>
+        </a:solidFill>
+        <a:gradFill rotWithShape="1">
+          <a:gsLst>
+            <a:gs pos="0">
+              <a:schemeClr val="phClr">
+                <a:lumMod val="110000"/>
+                <a:satMod val="105000"/>
+                <a:tint val="67000"/>
+              </a:schemeClr>
+            </a:gs>
+            <a:gs pos="50000">
+              <a:schemeClr val="phClr">
+                <a:lumMod val="105000"/>
+                <a:satMod val="103000"/>
+                <a:tint val="73000"/>
+              </a:schemeClr>
+            </a:gs>
+            <a:gs pos="100000">
+              <a:schemeClr val="phClr">
+                <a:lumMod val="105000"/>
+                <a:satMod val="109000"/>
+                <a:tint val="81000"/>
+              </a:schemeClr>
+            </a:gs>
+          </a:gsLst>
+          <a:lin ang="5400000" scaled="0"/>
+        </a:gradFill>
+        <a:gradFill rotWithShape="1">
+          <a:gsLst>
+            <a:gs pos="0">
+              <a:schemeClr val="phClr">
+                <a:satMod val="103000"/>
+                <a:lumMod val="102000"/>
+                <a:tint val="94000"/>
+              </a:schemeClr>
+            </a:gs>
+            <a:gs pos="50000">
+              <a:schemeClr val="phClr">
+                <a:satMod val="110000"/>
+                <a:lumMod val="100000"/>
+                <a:shade val="100000"/>
+              </a:schemeClr>
+            </a:gs>
+            <a:gs pos="100000">
+              <a:schemeClr val="phClr">
+                <a:lumMod val="99000"/>
+                <a:satMod val="120000"/>
+                <a:shade val="78000"/>
+              </a:schemeClr>
+            </a:gs>
+          </a:gsLst>
+          <a:lin ang="5400000" scaled="0"/>
+        </a:gradFill>
+      </a:fillStyleLst>
+      <a:lnStyleLst>
+        <a:ln w="6350" cap="flat" cmpd="sng" algn="ctr">
+          <a:solidFill>
+            <a:schemeClr val="phClr"/>
+          </a:solidFill>
+          <a:prstDash val="solid"/>
+          <a:miter lim="800000"/>
+        </a:ln>
+        <a:ln w="12700" cap="flat" cmpd="sng" algn="ctr">
+          <a:solidFill>
+            <a:schemeClr val="phClr"/>
+          </a:solidFill>
+          <a:prstDash val="solid"/>
+          <a:miter lim="800000"/>
+        </a:ln>
+        <a:ln w="19050" cap="flat" cmpd="sng" algn="ctr">
+          <a:solidFill>
+            <a:schemeClr val="phClr"/>
+          </a:solidFill>
+          <a:prstDash val="solid"/>
+          <a:miter lim="800000"/>
+        </a:ln>
+      </a:lnStyleLst>
+      <a:effectStyleLst>
+        <a:effectStyle>
+          <a:effectLst/>
+        </a:effectStyle>
+        <a:effectStyle>
+          <a:effectLst/>
+        </a:effectStyle>
+        <a:effectStyle>
+          <a:effectLst>
+            <a:outerShdw blurRad="57150" dist="19050" dir="5400000" algn="ctr" rotWithShape="0">
+              <a:srgbClr val="000000">
+                <a:alpha val="63000"/>
+              </a:srgbClr>
+            </a:outerShdw>
+          </a:effectLst>
+        </a:effectStyle>
+      </a:effectStyleLst>
+      <a:bgFillStyleLst>
+        <a:solidFill>
+          <a:schemeClr val="phClr"/>
+        </a:solidFill>
+        <a:solidFill>
+          <a:schemeClr val="phClr">
+            <a:tint val="95000"/>
+            <a:satMod val="170000"/>
+          </a:schemeClr>
+        </a:solidFill>
+        <a:gradFill rotWithShape="1">
+          <a:gsLst>
+            <a:gs pos="0">
+              <a:schemeClr val="phClr">
+                <a:tint val="93000"/>
+                <a:satMod val="150000"/>
+                <a:shade val="98000"/>
+                <a:lumMod val="102000"/>
+              </a:schemeClr>
+            </a:gs>
+            <a:gs pos="50000">
+              <a:schemeClr val="phClr">
+                <a:tint val="98000"/>
+                <a:satMod val="130000"/>
+                <a:shade val="90000"/>
+                <a:lumMod val="103000"/>
+              </a:schemeClr>
+            </a:gs>
+            <a:gs pos="100000">
+              <a:schemeClr val="phClr">
+                <a:shade val="63000"/>
+                <a:satMod val="120000"/>
+              </a:schemeClr>
+            </a:gs>
+          </a:gsLst>
+          <a:lin ang="5400000" scaled="0"/>
+        </a:gradFill>
+      </a:bgFillStyleLst>
+    </a:fmtScheme>
+  </a:themeElements>
+  <a:objectDefaults/>
+  <a:extraClrSchemeLst/>
+  <a:extLst>
+    <a:ext uri="{05A4C25C-085E-4340-85A3-A5531E510DB2}">
+      <thm15:themeFamily xmlns:thm15="http://schemas.microsoft.com/office/thememl/2012/main" name="Office Theme" id="{62F939B6-93AF-4DB8-9C6B-D6C7DFDC589F}" vid="{4A3C46E8-61CC-4603-A589-7422A47A8E4A}"/>
+    </a:ext>
+  </a:extLst>
+</a:theme>
 </file>
</xml_diff>